<commit_message>
Updated to Day 2 presentation
</commit_message>
<xml_diff>
--- a/Presentations/Postgresql Presentation Day 2.pptx
+++ b/Presentations/Postgresql Presentation Day 2.pptx
@@ -5,7 +5,7 @@
     <p:sldMasterId id="2147483668" r:id="rId1"/>
   </p:sldMasterIdLst>
   <p:handoutMasterIdLst>
-    <p:handoutMasterId r:id="rId9"/>
+    <p:handoutMasterId r:id="rId18"/>
   </p:handoutMasterIdLst>
   <p:sldIdLst>
     <p:sldId id="257" r:id="rId2"/>
@@ -13,8 +13,17 @@
     <p:sldId id="278" r:id="rId4"/>
     <p:sldId id="291" r:id="rId5"/>
     <p:sldId id="290" r:id="rId6"/>
-    <p:sldId id="292" r:id="rId7"/>
-    <p:sldId id="285" r:id="rId8"/>
+    <p:sldId id="293" r:id="rId7"/>
+    <p:sldId id="294" r:id="rId8"/>
+    <p:sldId id="295" r:id="rId9"/>
+    <p:sldId id="296" r:id="rId10"/>
+    <p:sldId id="297" r:id="rId11"/>
+    <p:sldId id="285" r:id="rId12"/>
+    <p:sldId id="298" r:id="rId13"/>
+    <p:sldId id="299" r:id="rId14"/>
+    <p:sldId id="300" r:id="rId15"/>
+    <p:sldId id="301" r:id="rId16"/>
+    <p:sldId id="302" r:id="rId17"/>
   </p:sldIdLst>
   <p:sldSz cx="12192000" cy="6858000"/>
   <p:notesSz cx="6858000" cy="9144000"/>
@@ -206,7 +215,7 @@
           <a:p>
             <a:fld id="{11A92A65-2685-4FA5-8B48-11F8E673727C}" type="datetimeFigureOut">
               <a:rPr lang="en-US" smtClean="0"/>
-              <a:t>8/27/2016</a:t>
+              <a:t>8/28/2016</a:t>
             </a:fld>
             <a:endParaRPr lang="en-US"/>
           </a:p>
@@ -1035,7 +1044,7 @@
             <a:fld id="{B61BEF0D-F0BB-DE4B-95CE-6DB70DBA9567}" type="datetimeFigureOut">
               <a:rPr lang="en-US" smtClean="0"/>
               <a:pPr/>
-              <a:t>8/27/2016</a:t>
+              <a:t>8/28/2016</a:t>
             </a:fld>
             <a:endParaRPr lang="en-US" dirty="0"/>
           </a:p>
@@ -1288,7 +1297,7 @@
             <a:fld id="{B61BEF0D-F0BB-DE4B-95CE-6DB70DBA9567}" type="datetimeFigureOut">
               <a:rPr lang="en-US" smtClean="0"/>
               <a:pPr/>
-              <a:t>8/27/2016</a:t>
+              <a:t>8/28/2016</a:t>
             </a:fld>
             <a:endParaRPr lang="en-US" dirty="0"/>
           </a:p>
@@ -1604,7 +1613,7 @@
             <a:fld id="{B61BEF0D-F0BB-DE4B-95CE-6DB70DBA9567}" type="datetimeFigureOut">
               <a:rPr lang="en-US" smtClean="0"/>
               <a:pPr/>
-              <a:t>8/27/2016</a:t>
+              <a:t>8/28/2016</a:t>
             </a:fld>
             <a:endParaRPr lang="en-US" dirty="0"/>
           </a:p>
@@ -1939,7 +1948,7 @@
             <a:fld id="{B61BEF0D-F0BB-DE4B-95CE-6DB70DBA9567}" type="datetimeFigureOut">
               <a:rPr lang="en-US" smtClean="0"/>
               <a:pPr/>
-              <a:t>8/27/2016</a:t>
+              <a:t>8/28/2016</a:t>
             </a:fld>
             <a:endParaRPr lang="en-US" dirty="0"/>
           </a:p>
@@ -2255,7 +2264,7 @@
             <a:fld id="{B61BEF0D-F0BB-DE4B-95CE-6DB70DBA9567}" type="datetimeFigureOut">
               <a:rPr lang="en-US" smtClean="0"/>
               <a:pPr/>
-              <a:t>8/27/2016</a:t>
+              <a:t>8/28/2016</a:t>
             </a:fld>
             <a:endParaRPr lang="en-US" dirty="0"/>
           </a:p>
@@ -2650,7 +2659,7 @@
             <a:fld id="{B61BEF0D-F0BB-DE4B-95CE-6DB70DBA9567}" type="datetimeFigureOut">
               <a:rPr lang="en-US" smtClean="0"/>
               <a:pPr/>
-              <a:t>8/27/2016</a:t>
+              <a:t>8/28/2016</a:t>
             </a:fld>
             <a:endParaRPr lang="en-US" dirty="0"/>
           </a:p>
@@ -2821,7 +2830,7 @@
           <a:p>
             <a:fld id="{55C6B4A9-1611-4792-9094-5F34BCA07E0B}" type="datetimeFigureOut">
               <a:rPr lang="en-US" smtClean="0"/>
-              <a:t>8/27/2016</a:t>
+              <a:t>8/28/2016</a:t>
             </a:fld>
             <a:endParaRPr lang="en-US" dirty="0"/>
           </a:p>
@@ -3002,7 +3011,7 @@
             <a:fld id="{B61BEF0D-F0BB-DE4B-95CE-6DB70DBA9567}" type="datetimeFigureOut">
               <a:rPr lang="en-US" smtClean="0"/>
               <a:pPr/>
-              <a:t>8/27/2016</a:t>
+              <a:t>8/28/2016</a:t>
             </a:fld>
             <a:endParaRPr lang="en-US" dirty="0"/>
           </a:p>
@@ -3174,7 +3183,7 @@
             <a:fld id="{B61BEF0D-F0BB-DE4B-95CE-6DB70DBA9567}" type="datetimeFigureOut">
               <a:rPr lang="en-US" smtClean="0"/>
               <a:pPr/>
-              <a:t>8/27/2016</a:t>
+              <a:t>8/28/2016</a:t>
             </a:fld>
             <a:endParaRPr lang="en-US" dirty="0"/>
           </a:p>
@@ -3423,7 +3432,7 @@
             <a:fld id="{B61BEF0D-F0BB-DE4B-95CE-6DB70DBA9567}" type="datetimeFigureOut">
               <a:rPr lang="en-US" smtClean="0"/>
               <a:pPr/>
-              <a:t>8/27/2016</a:t>
+              <a:t>8/28/2016</a:t>
             </a:fld>
             <a:endParaRPr lang="en-US" dirty="0"/>
           </a:p>
@@ -3656,7 +3665,7 @@
           <a:p>
             <a:fld id="{EB712588-04B1-427B-82EE-E8DB90309F08}" type="datetimeFigureOut">
               <a:rPr lang="en-US" smtClean="0"/>
-              <a:t>8/27/2016</a:t>
+              <a:t>8/28/2016</a:t>
             </a:fld>
             <a:endParaRPr lang="en-US" dirty="0"/>
           </a:p>
@@ -4031,7 +4040,7 @@
             <a:fld id="{B61BEF0D-F0BB-DE4B-95CE-6DB70DBA9567}" type="datetimeFigureOut">
               <a:rPr lang="en-US" smtClean="0"/>
               <a:pPr/>
-              <a:t>8/27/2016</a:t>
+              <a:t>8/28/2016</a:t>
             </a:fld>
             <a:endParaRPr lang="en-US" dirty="0"/>
           </a:p>
@@ -4156,7 +4165,7 @@
             <a:fld id="{B61BEF0D-F0BB-DE4B-95CE-6DB70DBA9567}" type="datetimeFigureOut">
               <a:rPr lang="en-US" smtClean="0"/>
               <a:pPr/>
-              <a:t>8/27/2016</a:t>
+              <a:t>8/28/2016</a:t>
             </a:fld>
             <a:endParaRPr lang="en-US" dirty="0"/>
           </a:p>
@@ -4253,7 +4262,7 @@
             <a:fld id="{B61BEF0D-F0BB-DE4B-95CE-6DB70DBA9567}" type="datetimeFigureOut">
               <a:rPr lang="en-US" smtClean="0"/>
               <a:pPr/>
-              <a:t>8/27/2016</a:t>
+              <a:t>8/28/2016</a:t>
             </a:fld>
             <a:endParaRPr lang="en-US" dirty="0"/>
           </a:p>
@@ -4509,7 +4518,7 @@
           <a:p>
             <a:fld id="{42A54C80-263E-416B-A8E0-580EDEADCBDC}" type="datetimeFigureOut">
               <a:rPr lang="en-US" smtClean="0"/>
-              <a:t>8/27/2016</a:t>
+              <a:t>8/28/2016</a:t>
             </a:fld>
             <a:endParaRPr lang="en-US" dirty="0"/>
           </a:p>
@@ -4816,7 +4825,7 @@
             <a:fld id="{B61BEF0D-F0BB-DE4B-95CE-6DB70DBA9567}" type="datetimeFigureOut">
               <a:rPr lang="en-US" smtClean="0"/>
               <a:pPr/>
-              <a:t>8/27/2016</a:t>
+              <a:t>8/28/2016</a:t>
             </a:fld>
             <a:endParaRPr lang="en-US" dirty="0"/>
           </a:p>
@@ -5519,7 +5528,7 @@
             <a:fld id="{B61BEF0D-F0BB-DE4B-95CE-6DB70DBA9567}" type="datetimeFigureOut">
               <a:rPr lang="en-US" smtClean="0"/>
               <a:pPr/>
-              <a:t>8/27/2016</a:t>
+              <a:t>8/28/2016</a:t>
             </a:fld>
             <a:endParaRPr lang="en-US" dirty="0"/>
           </a:p>
@@ -6110,6 +6119,1346 @@
 </p:sld>
 </file>
 
+<file path=ppt/slides/slide10.xml><?xml version="1.0" encoding="utf-8"?>
+<p:sld xmlns:a="http://schemas.openxmlformats.org/drawingml/2006/main" xmlns:r="http://schemas.openxmlformats.org/officeDocument/2006/relationships" xmlns:p="http://schemas.openxmlformats.org/presentationml/2006/main">
+  <p:cSld>
+    <p:spTree>
+      <p:nvGrpSpPr>
+        <p:cNvPr id="1" name=""/>
+        <p:cNvGrpSpPr/>
+        <p:nvPr/>
+      </p:nvGrpSpPr>
+      <p:grpSpPr>
+        <a:xfrm>
+          <a:off x="0" y="0"/>
+          <a:ext cx="0" cy="0"/>
+          <a:chOff x="0" y="0"/>
+          <a:chExt cx="0" cy="0"/>
+        </a:xfrm>
+      </p:grpSpPr>
+      <p:sp>
+        <p:nvSpPr>
+          <p:cNvPr id="2" name="Title 1"/>
+          <p:cNvSpPr>
+            <a:spLocks noGrp="1"/>
+          </p:cNvSpPr>
+          <p:nvPr>
+            <p:ph type="title"/>
+          </p:nvPr>
+        </p:nvSpPr>
+        <p:spPr>
+          <a:xfrm>
+            <a:off x="677334" y="0"/>
+            <a:ext cx="8878558" cy="1320800"/>
+          </a:xfrm>
+        </p:spPr>
+        <p:txBody>
+          <a:bodyPr>
+            <a:normAutofit/>
+          </a:bodyPr>
+          <a:lstStyle/>
+          <a:p>
+            <a:r>
+              <a:rPr lang="en-US" dirty="0" smtClean="0"/>
+              <a:t>Client Tools</a:t>
+            </a:r>
+            <a:endParaRPr lang="en-US" dirty="0"/>
+          </a:p>
+        </p:txBody>
+      </p:sp>
+      <p:sp>
+        <p:nvSpPr>
+          <p:cNvPr id="3" name="Subtitle 2"/>
+          <p:cNvSpPr>
+            <a:spLocks noGrp="1"/>
+          </p:cNvSpPr>
+          <p:nvPr>
+            <p:ph idx="1"/>
+          </p:nvPr>
+        </p:nvSpPr>
+        <p:spPr>
+          <a:xfrm>
+            <a:off x="677334" y="1219200"/>
+            <a:ext cx="9768244" cy="5461685"/>
+          </a:xfrm>
+        </p:spPr>
+        <p:txBody>
+          <a:bodyPr>
+            <a:normAutofit/>
+          </a:bodyPr>
+          <a:lstStyle/>
+          <a:p>
+            <a:pPr fontAlgn="base"/>
+            <a:r>
+              <a:rPr lang="en-US" dirty="0">
+                <a:hlinkClick r:id="rId2"/>
+              </a:rPr>
+              <a:t>https://</a:t>
+            </a:r>
+            <a:r>
+              <a:rPr lang="en-US" dirty="0" smtClean="0">
+                <a:hlinkClick r:id="rId2"/>
+              </a:rPr>
+              <a:t>www.safaribooksonline.com/library/view/postgresql-for-data/9781783288601/ch06.html</a:t>
+            </a:r>
+            <a:endParaRPr lang="en-US" dirty="0" smtClean="0"/>
+          </a:p>
+          <a:p>
+            <a:pPr fontAlgn="base"/>
+            <a:r>
+              <a:rPr lang="en-US" dirty="0" err="1" smtClean="0"/>
+              <a:t>Psql</a:t>
+            </a:r>
+            <a:endParaRPr lang="en-US" dirty="0" smtClean="0"/>
+          </a:p>
+          <a:p>
+            <a:pPr fontAlgn="base"/>
+            <a:r>
+              <a:rPr lang="en-US" dirty="0" err="1" smtClean="0"/>
+              <a:t>Pgadmin</a:t>
+            </a:r>
+            <a:r>
+              <a:rPr lang="en-US" dirty="0" smtClean="0"/>
+              <a:t> 3</a:t>
+            </a:r>
+          </a:p>
+          <a:p>
+            <a:pPr fontAlgn="base"/>
+            <a:r>
+              <a:rPr lang="en-US" dirty="0" err="1" smtClean="0"/>
+              <a:t>Pgadmin</a:t>
+            </a:r>
+            <a:r>
+              <a:rPr lang="en-US" dirty="0" smtClean="0"/>
+              <a:t> 4</a:t>
+            </a:r>
+          </a:p>
+          <a:p>
+            <a:pPr fontAlgn="base"/>
+            <a:endParaRPr lang="en-US" dirty="0" smtClean="0"/>
+          </a:p>
+          <a:p>
+            <a:pPr fontAlgn="base"/>
+            <a:endParaRPr lang="en-US" dirty="0" smtClean="0"/>
+          </a:p>
+          <a:p>
+            <a:pPr marL="0" indent="0" fontAlgn="base">
+              <a:buNone/>
+            </a:pPr>
+            <a:endParaRPr lang="en-US" dirty="0"/>
+          </a:p>
+        </p:txBody>
+      </p:sp>
+    </p:spTree>
+    <p:extLst>
+      <p:ext uri="{BB962C8B-B14F-4D97-AF65-F5344CB8AC3E}">
+        <p14:creationId xmlns:p14="http://schemas.microsoft.com/office/powerpoint/2010/main" val="601706753"/>
+      </p:ext>
+    </p:extLst>
+  </p:cSld>
+  <p:clrMapOvr>
+    <a:masterClrMapping/>
+  </p:clrMapOvr>
+  <p:timing>
+    <p:tnLst>
+      <p:par>
+        <p:cTn id="1" dur="indefinite" restart="never" nodeType="tmRoot"/>
+      </p:par>
+    </p:tnLst>
+  </p:timing>
+</p:sld>
+</file>
+
+<file path=ppt/slides/slide11.xml><?xml version="1.0" encoding="utf-8"?>
+<p:sld xmlns:a="http://schemas.openxmlformats.org/drawingml/2006/main" xmlns:r="http://schemas.openxmlformats.org/officeDocument/2006/relationships" xmlns:p="http://schemas.openxmlformats.org/presentationml/2006/main">
+  <p:cSld>
+    <p:spTree>
+      <p:nvGrpSpPr>
+        <p:cNvPr id="1" name=""/>
+        <p:cNvGrpSpPr/>
+        <p:nvPr/>
+      </p:nvGrpSpPr>
+      <p:grpSpPr>
+        <a:xfrm>
+          <a:off x="0" y="0"/>
+          <a:ext cx="0" cy="0"/>
+          <a:chOff x="0" y="0"/>
+          <a:chExt cx="0" cy="0"/>
+        </a:xfrm>
+      </p:grpSpPr>
+      <p:sp>
+        <p:nvSpPr>
+          <p:cNvPr id="2" name="Title 1"/>
+          <p:cNvSpPr>
+            <a:spLocks noGrp="1"/>
+          </p:cNvSpPr>
+          <p:nvPr>
+            <p:ph type="title"/>
+          </p:nvPr>
+        </p:nvSpPr>
+        <p:spPr>
+          <a:xfrm>
+            <a:off x="677334" y="0"/>
+            <a:ext cx="8596668" cy="1320800"/>
+          </a:xfrm>
+        </p:spPr>
+        <p:txBody>
+          <a:bodyPr/>
+          <a:lstStyle/>
+          <a:p>
+            <a:r>
+              <a:rPr lang="en-US" dirty="0" smtClean="0"/>
+              <a:t>Appendix</a:t>
+            </a:r>
+            <a:br>
+              <a:rPr lang="en-US" dirty="0" smtClean="0"/>
+            </a:br>
+            <a:endParaRPr lang="en-US" dirty="0"/>
+          </a:p>
+        </p:txBody>
+      </p:sp>
+      <p:sp>
+        <p:nvSpPr>
+          <p:cNvPr id="3" name="Subtitle 2"/>
+          <p:cNvSpPr>
+            <a:spLocks noGrp="1"/>
+          </p:cNvSpPr>
+          <p:nvPr>
+            <p:ph idx="1"/>
+          </p:nvPr>
+        </p:nvSpPr>
+        <p:spPr>
+          <a:xfrm>
+            <a:off x="677334" y="1219200"/>
+            <a:ext cx="9768244" cy="5461685"/>
+          </a:xfrm>
+        </p:spPr>
+        <p:txBody>
+          <a:bodyPr>
+            <a:normAutofit/>
+          </a:bodyPr>
+          <a:lstStyle/>
+          <a:p>
+            <a:pPr fontAlgn="base"/>
+            <a:endParaRPr lang="en-US" dirty="0"/>
+          </a:p>
+        </p:txBody>
+      </p:sp>
+    </p:spTree>
+    <p:extLst>
+      <p:ext uri="{BB962C8B-B14F-4D97-AF65-F5344CB8AC3E}">
+        <p14:creationId xmlns:p14="http://schemas.microsoft.com/office/powerpoint/2010/main" val="526200546"/>
+      </p:ext>
+    </p:extLst>
+  </p:cSld>
+  <p:clrMapOvr>
+    <a:masterClrMapping/>
+  </p:clrMapOvr>
+</p:sld>
+</file>
+
+<file path=ppt/slides/slide12.xml><?xml version="1.0" encoding="utf-8"?>
+<p:sld xmlns:a="http://schemas.openxmlformats.org/drawingml/2006/main" xmlns:r="http://schemas.openxmlformats.org/officeDocument/2006/relationships" xmlns:p="http://schemas.openxmlformats.org/presentationml/2006/main">
+  <p:cSld>
+    <p:spTree>
+      <p:nvGrpSpPr>
+        <p:cNvPr id="1" name=""/>
+        <p:cNvGrpSpPr/>
+        <p:nvPr/>
+      </p:nvGrpSpPr>
+      <p:grpSpPr>
+        <a:xfrm>
+          <a:off x="0" y="0"/>
+          <a:ext cx="0" cy="0"/>
+          <a:chOff x="0" y="0"/>
+          <a:chExt cx="0" cy="0"/>
+        </a:xfrm>
+      </p:grpSpPr>
+      <p:sp>
+        <p:nvSpPr>
+          <p:cNvPr id="2" name="Title 1"/>
+          <p:cNvSpPr>
+            <a:spLocks noGrp="1"/>
+          </p:cNvSpPr>
+          <p:nvPr>
+            <p:ph type="title"/>
+          </p:nvPr>
+        </p:nvSpPr>
+        <p:spPr>
+          <a:xfrm>
+            <a:off x="677334" y="0"/>
+            <a:ext cx="8596668" cy="1320800"/>
+          </a:xfrm>
+        </p:spPr>
+        <p:txBody>
+          <a:bodyPr/>
+          <a:lstStyle/>
+          <a:p>
+            <a:r>
+              <a:rPr lang="en-US" dirty="0" smtClean="0"/>
+              <a:t>Appendix – Backup And Recovery - Intro</a:t>
+            </a:r>
+            <a:r>
+              <a:rPr lang="en-US" dirty="0" smtClean="0"/>
+              <a:t/>
+            </a:r>
+            <a:br>
+              <a:rPr lang="en-US" dirty="0" smtClean="0"/>
+            </a:br>
+            <a:endParaRPr lang="en-US" dirty="0"/>
+          </a:p>
+        </p:txBody>
+      </p:sp>
+      <p:sp>
+        <p:nvSpPr>
+          <p:cNvPr id="3" name="Subtitle 2"/>
+          <p:cNvSpPr>
+            <a:spLocks noGrp="1"/>
+          </p:cNvSpPr>
+          <p:nvPr>
+            <p:ph idx="1"/>
+          </p:nvPr>
+        </p:nvSpPr>
+        <p:spPr>
+          <a:xfrm>
+            <a:off x="677334" y="1219200"/>
+            <a:ext cx="9768244" cy="5461685"/>
+          </a:xfrm>
+        </p:spPr>
+        <p:txBody>
+          <a:bodyPr>
+            <a:normAutofit/>
+          </a:bodyPr>
+          <a:lstStyle/>
+          <a:p>
+            <a:pPr fontAlgn="base"/>
+            <a:r>
+              <a:rPr lang="en-US" dirty="0"/>
+              <a:t>Backup and recovery usually refers to protecting the database against the loss of data and enables the restoration of data in the event of a data loss. A backup, in simple terms, is a copy of your database data.</a:t>
+            </a:r>
+          </a:p>
+          <a:p>
+            <a:pPr fontAlgn="base"/>
+            <a:endParaRPr lang="en-US" dirty="0"/>
+          </a:p>
+          <a:p>
+            <a:pPr fontAlgn="base"/>
+            <a:r>
+              <a:rPr lang="en-US" dirty="0"/>
+              <a:t>Backups are divided into two components:</a:t>
+            </a:r>
+          </a:p>
+          <a:p>
+            <a:pPr fontAlgn="base"/>
+            <a:endParaRPr lang="en-US" dirty="0"/>
+          </a:p>
+          <a:p>
+            <a:pPr lvl="1" fontAlgn="base"/>
+            <a:r>
+              <a:rPr lang="en-US" dirty="0"/>
+              <a:t>Logical backups: A logical backup refers to the dump file that is created by the </a:t>
+            </a:r>
+            <a:r>
+              <a:rPr lang="en-US" dirty="0" err="1"/>
+              <a:t>pg_dump</a:t>
+            </a:r>
+            <a:r>
+              <a:rPr lang="en-US" dirty="0"/>
+              <a:t> utility and which might be used to restore the database in the case of a data loss or an accidental deletion of a database object, such as a table. The </a:t>
+            </a:r>
+            <a:r>
+              <a:rPr lang="en-US" dirty="0" err="1"/>
+              <a:t>pg_dump</a:t>
+            </a:r>
+            <a:r>
+              <a:rPr lang="en-US" dirty="0"/>
+              <a:t> utility is a PostgreSQL specific utility that can be run on the command line, which makes a connection to the database and initiates the logical backup.</a:t>
+            </a:r>
+          </a:p>
+          <a:p>
+            <a:pPr lvl="1" fontAlgn="base"/>
+            <a:r>
+              <a:rPr lang="en-US" dirty="0"/>
+              <a:t>Physical backups: A physical backup refers to the OS level backup of a database directory and its associated files.</a:t>
+            </a:r>
+          </a:p>
+          <a:p>
+            <a:pPr fontAlgn="base"/>
+            <a:r>
+              <a:rPr lang="en-US" dirty="0"/>
+              <a:t>It is essential to have a planning strategy in order to implement backups. This is desirable from the point of view of a recovery scenario, and in the event of such a situation arising, the type of backups that we initiate will influence the type of recovery that is possible.</a:t>
+            </a:r>
+            <a:endParaRPr lang="en-US" dirty="0"/>
+          </a:p>
+        </p:txBody>
+      </p:sp>
+    </p:spTree>
+    <p:extLst>
+      <p:ext uri="{BB962C8B-B14F-4D97-AF65-F5344CB8AC3E}">
+        <p14:creationId xmlns:p14="http://schemas.microsoft.com/office/powerpoint/2010/main" val="917579460"/>
+      </p:ext>
+    </p:extLst>
+  </p:cSld>
+  <p:clrMapOvr>
+    <a:masterClrMapping/>
+  </p:clrMapOvr>
+</p:sld>
+</file>
+
+<file path=ppt/slides/slide13.xml><?xml version="1.0" encoding="utf-8"?>
+<p:sld xmlns:a="http://schemas.openxmlformats.org/drawingml/2006/main" xmlns:r="http://schemas.openxmlformats.org/officeDocument/2006/relationships" xmlns:p="http://schemas.openxmlformats.org/presentationml/2006/main">
+  <p:cSld>
+    <p:spTree>
+      <p:nvGrpSpPr>
+        <p:cNvPr id="1" name=""/>
+        <p:cNvGrpSpPr/>
+        <p:nvPr/>
+      </p:nvGrpSpPr>
+      <p:grpSpPr>
+        <a:xfrm>
+          <a:off x="0" y="0"/>
+          <a:ext cx="0" cy="0"/>
+          <a:chOff x="0" y="0"/>
+          <a:chExt cx="0" cy="0"/>
+        </a:xfrm>
+      </p:grpSpPr>
+      <p:sp>
+        <p:nvSpPr>
+          <p:cNvPr id="2" name="Title 1"/>
+          <p:cNvSpPr>
+            <a:spLocks noGrp="1"/>
+          </p:cNvSpPr>
+          <p:nvPr>
+            <p:ph type="title"/>
+          </p:nvPr>
+        </p:nvSpPr>
+        <p:spPr>
+          <a:xfrm>
+            <a:off x="677334" y="0"/>
+            <a:ext cx="8596668" cy="1320800"/>
+          </a:xfrm>
+        </p:spPr>
+        <p:txBody>
+          <a:bodyPr>
+            <a:normAutofit fontScale="90000"/>
+          </a:bodyPr>
+          <a:lstStyle/>
+          <a:p>
+            <a:r>
+              <a:rPr lang="en-US" dirty="0" smtClean="0"/>
+              <a:t>Appendix – Backup – Logical Backups – Getting Ready</a:t>
+            </a:r>
+            <a:r>
+              <a:rPr lang="en-US" dirty="0" smtClean="0"/>
+              <a:t/>
+            </a:r>
+            <a:br>
+              <a:rPr lang="en-US" dirty="0" smtClean="0"/>
+            </a:br>
+            <a:endParaRPr lang="en-US" dirty="0"/>
+          </a:p>
+        </p:txBody>
+      </p:sp>
+      <p:sp>
+        <p:nvSpPr>
+          <p:cNvPr id="3" name="Subtitle 2"/>
+          <p:cNvSpPr>
+            <a:spLocks noGrp="1"/>
+          </p:cNvSpPr>
+          <p:nvPr>
+            <p:ph idx="1"/>
+          </p:nvPr>
+        </p:nvSpPr>
+        <p:spPr>
+          <a:xfrm>
+            <a:off x="677334" y="1219200"/>
+            <a:ext cx="9768244" cy="5461685"/>
+          </a:xfrm>
+        </p:spPr>
+        <p:txBody>
+          <a:bodyPr>
+            <a:normAutofit/>
+          </a:bodyPr>
+          <a:lstStyle/>
+          <a:p>
+            <a:pPr fontAlgn="base"/>
+            <a:r>
+              <a:rPr lang="en-US" dirty="0"/>
+              <a:t>Please note that the dump keyword is evenly used here as a synonym for </a:t>
+            </a:r>
+            <a:r>
+              <a:rPr lang="en-US" dirty="0" err="1"/>
+              <a:t>backup.The</a:t>
+            </a:r>
+            <a:r>
+              <a:rPr lang="en-US" dirty="0"/>
+              <a:t> </a:t>
+            </a:r>
+            <a:r>
+              <a:rPr lang="en-US" dirty="0" err="1"/>
+              <a:t>pg_dump</a:t>
+            </a:r>
+            <a:r>
+              <a:rPr lang="en-US" dirty="0"/>
+              <a:t> utility is considered to be a logical backup because it makes a copy of the data in the database by dumping out the contents of each table</a:t>
+            </a:r>
+            <a:r>
+              <a:rPr lang="en-US" dirty="0" smtClean="0"/>
+              <a:t>.</a:t>
+            </a:r>
+          </a:p>
+          <a:p>
+            <a:pPr fontAlgn="base"/>
+            <a:r>
+              <a:rPr lang="en-US" dirty="0" smtClean="0"/>
+              <a:t>The </a:t>
+            </a:r>
+            <a:r>
+              <a:rPr lang="en-US" dirty="0"/>
+              <a:t>basic syntax to take a logical backup of a single database is mentioned here</a:t>
+            </a:r>
+            <a:r>
+              <a:rPr lang="en-US" dirty="0" smtClean="0"/>
+              <a:t>:</a:t>
+            </a:r>
+          </a:p>
+          <a:p>
+            <a:pPr lvl="1" fontAlgn="base"/>
+            <a:r>
+              <a:rPr lang="en-US" dirty="0" err="1" smtClean="0"/>
+              <a:t>pg_dump</a:t>
+            </a:r>
+            <a:r>
+              <a:rPr lang="en-US" dirty="0" smtClean="0"/>
+              <a:t> </a:t>
+            </a:r>
+            <a:r>
+              <a:rPr lang="en-US" dirty="0"/>
+              <a:t>-U username -W -F t </a:t>
+            </a:r>
+            <a:r>
+              <a:rPr lang="en-US" dirty="0" err="1"/>
+              <a:t>database_name</a:t>
+            </a:r>
+            <a:r>
+              <a:rPr lang="en-US" dirty="0"/>
+              <a:t> &gt; [Backup Location Path</a:t>
+            </a:r>
+            <a:r>
+              <a:rPr lang="en-US" dirty="0" smtClean="0"/>
+              <a:t>]</a:t>
+            </a:r>
+          </a:p>
+          <a:p>
+            <a:pPr fontAlgn="base"/>
+            <a:r>
+              <a:rPr lang="en-US" dirty="0" smtClean="0"/>
+              <a:t>The </a:t>
+            </a:r>
+            <a:r>
+              <a:rPr lang="en-US" dirty="0"/>
+              <a:t>usage of the options used with the </a:t>
+            </a:r>
+            <a:r>
+              <a:rPr lang="en-US" dirty="0" err="1"/>
+              <a:t>pg_dump</a:t>
+            </a:r>
+            <a:r>
+              <a:rPr lang="en-US" dirty="0"/>
+              <a:t> command is explained here</a:t>
+            </a:r>
+            <a:r>
+              <a:rPr lang="en-US" dirty="0" smtClean="0"/>
+              <a:t>:</a:t>
+            </a:r>
+          </a:p>
+          <a:p>
+            <a:pPr lvl="1" fontAlgn="base"/>
+            <a:r>
+              <a:rPr lang="en-US" dirty="0" smtClean="0"/>
+              <a:t>U </a:t>
+            </a:r>
+            <a:r>
+              <a:rPr lang="en-US" dirty="0"/>
+              <a:t>switch: The -U switch specifies the database user initiating the connection. As </a:t>
+            </a:r>
+            <a:r>
+              <a:rPr lang="en-US" dirty="0" err="1"/>
+              <a:t>pg_dump</a:t>
+            </a:r>
+            <a:r>
+              <a:rPr lang="en-US" dirty="0"/>
+              <a:t> is a command-line utility, we need to specify the username via which the </a:t>
+            </a:r>
+            <a:r>
+              <a:rPr lang="en-US" dirty="0" err="1"/>
+              <a:t>pg_dump</a:t>
+            </a:r>
+            <a:r>
+              <a:rPr lang="en-US" dirty="0"/>
+              <a:t> utility can make a database connection</a:t>
+            </a:r>
+            <a:r>
+              <a:rPr lang="en-US" dirty="0" smtClean="0"/>
+              <a:t>.</a:t>
+            </a:r>
+          </a:p>
+          <a:p>
+            <a:pPr lvl="1" fontAlgn="base"/>
+            <a:r>
+              <a:rPr lang="en-US" dirty="0" smtClean="0"/>
+              <a:t>W </a:t>
+            </a:r>
+            <a:r>
+              <a:rPr lang="en-US" dirty="0"/>
+              <a:t>switch: This option is not mandatory. This option forces </a:t>
+            </a:r>
+            <a:r>
+              <a:rPr lang="en-US" dirty="0" err="1"/>
+              <a:t>pg_dump</a:t>
+            </a:r>
+            <a:r>
+              <a:rPr lang="en-US" dirty="0"/>
+              <a:t> to prompt for the password before connecting to the PostgreSQL database server. After you press Enter, </a:t>
+            </a:r>
+            <a:r>
+              <a:rPr lang="en-US" dirty="0" err="1"/>
+              <a:t>pg_dump</a:t>
+            </a:r>
+            <a:r>
+              <a:rPr lang="en-US" dirty="0"/>
+              <a:t> will prompt for the password of the database user from which the connection is initiated</a:t>
+            </a:r>
+            <a:r>
+              <a:rPr lang="en-US" dirty="0" smtClean="0"/>
+              <a:t>.</a:t>
+            </a:r>
+          </a:p>
+          <a:p>
+            <a:pPr lvl="1" fontAlgn="base"/>
+            <a:r>
+              <a:rPr lang="en-US" dirty="0" smtClean="0"/>
+              <a:t>F </a:t>
+            </a:r>
+            <a:r>
+              <a:rPr lang="en-US" dirty="0"/>
+              <a:t>switch: The -F switch specifies the output file format that will be used. We specified the t option with the -F switch because the output file will be implemented as a tar format archive file</a:t>
+            </a:r>
+            <a:r>
+              <a:rPr lang="en-US" dirty="0" smtClean="0"/>
+              <a:t>.</a:t>
+            </a:r>
+          </a:p>
+          <a:p>
+            <a:pPr fontAlgn="base"/>
+            <a:r>
+              <a:rPr lang="en-US" dirty="0" smtClean="0"/>
+              <a:t>There </a:t>
+            </a:r>
+            <a:r>
+              <a:rPr lang="en-US" dirty="0"/>
+              <a:t>are plenty of other options available with the </a:t>
+            </a:r>
+            <a:r>
+              <a:rPr lang="en-US" dirty="0" err="1"/>
+              <a:t>pg_dump</a:t>
+            </a:r>
+            <a:r>
+              <a:rPr lang="en-US" dirty="0"/>
+              <a:t> command; however, for our purpose, we are going to the use the preceding options.</a:t>
+            </a:r>
+            <a:endParaRPr lang="en-US" dirty="0"/>
+          </a:p>
+        </p:txBody>
+      </p:sp>
+    </p:spTree>
+    <p:extLst>
+      <p:ext uri="{BB962C8B-B14F-4D97-AF65-F5344CB8AC3E}">
+        <p14:creationId xmlns:p14="http://schemas.microsoft.com/office/powerpoint/2010/main" val="1822078032"/>
+      </p:ext>
+    </p:extLst>
+  </p:cSld>
+  <p:clrMapOvr>
+    <a:masterClrMapping/>
+  </p:clrMapOvr>
+</p:sld>
+</file>
+
+<file path=ppt/slides/slide14.xml><?xml version="1.0" encoding="utf-8"?>
+<p:sld xmlns:a="http://schemas.openxmlformats.org/drawingml/2006/main" xmlns:r="http://schemas.openxmlformats.org/officeDocument/2006/relationships" xmlns:p="http://schemas.openxmlformats.org/presentationml/2006/main">
+  <p:cSld>
+    <p:spTree>
+      <p:nvGrpSpPr>
+        <p:cNvPr id="1" name=""/>
+        <p:cNvGrpSpPr/>
+        <p:nvPr/>
+      </p:nvGrpSpPr>
+      <p:grpSpPr>
+        <a:xfrm>
+          <a:off x="0" y="0"/>
+          <a:ext cx="0" cy="0"/>
+          <a:chOff x="0" y="0"/>
+          <a:chExt cx="0" cy="0"/>
+        </a:xfrm>
+      </p:grpSpPr>
+      <p:sp>
+        <p:nvSpPr>
+          <p:cNvPr id="2" name="Title 1"/>
+          <p:cNvSpPr>
+            <a:spLocks noGrp="1"/>
+          </p:cNvSpPr>
+          <p:nvPr>
+            <p:ph type="title"/>
+          </p:nvPr>
+        </p:nvSpPr>
+        <p:spPr>
+          <a:xfrm>
+            <a:off x="677334" y="0"/>
+            <a:ext cx="8596668" cy="1320800"/>
+          </a:xfrm>
+        </p:spPr>
+        <p:txBody>
+          <a:bodyPr>
+            <a:normAutofit fontScale="90000"/>
+          </a:bodyPr>
+          <a:lstStyle/>
+          <a:p>
+            <a:r>
+              <a:rPr lang="en-US" dirty="0" smtClean="0"/>
+              <a:t>Appendix – Backup – Logical Backups – Doing It</a:t>
+            </a:r>
+            <a:r>
+              <a:rPr lang="en-US" dirty="0" smtClean="0"/>
+              <a:t/>
+            </a:r>
+            <a:br>
+              <a:rPr lang="en-US" dirty="0" smtClean="0"/>
+            </a:br>
+            <a:endParaRPr lang="en-US" dirty="0"/>
+          </a:p>
+        </p:txBody>
+      </p:sp>
+      <p:sp>
+        <p:nvSpPr>
+          <p:cNvPr id="3" name="Subtitle 2"/>
+          <p:cNvSpPr>
+            <a:spLocks noGrp="1"/>
+          </p:cNvSpPr>
+          <p:nvPr>
+            <p:ph idx="1"/>
+          </p:nvPr>
+        </p:nvSpPr>
+        <p:spPr>
+          <a:xfrm>
+            <a:off x="677334" y="1219200"/>
+            <a:ext cx="9768244" cy="5461685"/>
+          </a:xfrm>
+        </p:spPr>
+        <p:txBody>
+          <a:bodyPr>
+            <a:normAutofit/>
+          </a:bodyPr>
+          <a:lstStyle/>
+          <a:p>
+            <a:pPr fontAlgn="base"/>
+            <a:r>
+              <a:rPr lang="en-US" dirty="0"/>
+              <a:t>Here, in our situation, we have a database named </a:t>
+            </a:r>
+            <a:r>
+              <a:rPr lang="en-US" dirty="0" err="1"/>
+              <a:t>dvdrental</a:t>
+            </a:r>
+            <a:r>
+              <a:rPr lang="en-US" dirty="0"/>
+              <a:t> for which we need to generate a logical dump</a:t>
+            </a:r>
+            <a:r>
+              <a:rPr lang="en-US" dirty="0" smtClean="0"/>
+              <a:t>.</a:t>
+            </a:r>
+          </a:p>
+          <a:p>
+            <a:pPr fontAlgn="base"/>
+            <a:r>
+              <a:rPr lang="en-US" dirty="0" smtClean="0"/>
+              <a:t>There </a:t>
+            </a:r>
+            <a:r>
+              <a:rPr lang="en-US" dirty="0"/>
+              <a:t>are two ways in which a logical dump can be initiated in PostgreSQL</a:t>
+            </a:r>
+            <a:r>
+              <a:rPr lang="en-US" dirty="0" smtClean="0"/>
+              <a:t>:</a:t>
+            </a:r>
+          </a:p>
+          <a:p>
+            <a:pPr lvl="1" fontAlgn="base"/>
+            <a:r>
+              <a:rPr lang="en-US" dirty="0" smtClean="0"/>
+              <a:t>The </a:t>
+            </a:r>
+            <a:r>
+              <a:rPr lang="en-US" dirty="0"/>
+              <a:t>first approach is to use the command-line utility </a:t>
+            </a:r>
+            <a:r>
+              <a:rPr lang="en-US" dirty="0" err="1"/>
+              <a:t>pg_dump</a:t>
+            </a:r>
+            <a:r>
+              <a:rPr lang="en-US" dirty="0"/>
+              <a:t> to make a logical dump of a database. </a:t>
+            </a:r>
+            <a:endParaRPr lang="en-US" dirty="0" smtClean="0"/>
+          </a:p>
+          <a:p>
+            <a:pPr lvl="1" fontAlgn="base"/>
+            <a:r>
+              <a:rPr lang="en-US" dirty="0" smtClean="0"/>
+              <a:t>Here</a:t>
+            </a:r>
+            <a:r>
+              <a:rPr lang="en-US" dirty="0"/>
+              <a:t>, we use the </a:t>
+            </a:r>
+            <a:r>
+              <a:rPr lang="en-US" dirty="0" err="1"/>
+              <a:t>pg_dump</a:t>
+            </a:r>
+            <a:r>
+              <a:rPr lang="en-US" dirty="0"/>
+              <a:t> utility to back up the </a:t>
+            </a:r>
+            <a:r>
+              <a:rPr lang="en-US" dirty="0" err="1"/>
+              <a:t>dvdrental</a:t>
+            </a:r>
+            <a:r>
+              <a:rPr lang="en-US" dirty="0"/>
+              <a:t> database in an output file named dvdrental.tar, which is saved in the </a:t>
+            </a:r>
+            <a:r>
+              <a:rPr lang="en-US" dirty="0" err="1"/>
+              <a:t>abcd</a:t>
+            </a:r>
+            <a:r>
+              <a:rPr lang="en-US" dirty="0"/>
+              <a:t> subdirectory of the home directory</a:t>
+            </a:r>
+            <a:r>
+              <a:rPr lang="en-US" dirty="0" smtClean="0"/>
+              <a:t>:</a:t>
+            </a:r>
+          </a:p>
+          <a:p>
+            <a:pPr lvl="2" fontAlgn="base"/>
+            <a:r>
+              <a:rPr lang="en-US" dirty="0" err="1" smtClean="0"/>
+              <a:t>pg_dump</a:t>
+            </a:r>
+            <a:r>
+              <a:rPr lang="en-US" dirty="0" smtClean="0"/>
+              <a:t> </a:t>
+            </a:r>
+            <a:r>
+              <a:rPr lang="en-US" dirty="0"/>
+              <a:t>-U </a:t>
+            </a:r>
+            <a:r>
+              <a:rPr lang="en-US" dirty="0" err="1"/>
+              <a:t>postgres</a:t>
+            </a:r>
+            <a:r>
+              <a:rPr lang="en-US" dirty="0"/>
+              <a:t> -W -F t </a:t>
+            </a:r>
+            <a:r>
+              <a:rPr lang="en-US" dirty="0" err="1"/>
+              <a:t>dvdrental</a:t>
+            </a:r>
+            <a:r>
+              <a:rPr lang="en-US" dirty="0"/>
+              <a:t> &gt; /</a:t>
+            </a:r>
+            <a:r>
+              <a:rPr lang="en-US" dirty="0" smtClean="0"/>
+              <a:t>home/</a:t>
+            </a:r>
+            <a:r>
+              <a:rPr lang="en-US" dirty="0" err="1" smtClean="0"/>
+              <a:t>abcd</a:t>
+            </a:r>
+            <a:r>
+              <a:rPr lang="en-US" dirty="0" smtClean="0"/>
+              <a:t>/dvdrental.tar</a:t>
+            </a:r>
+          </a:p>
+          <a:p>
+            <a:pPr fontAlgn="base"/>
+            <a:r>
+              <a:rPr lang="en-US" dirty="0" smtClean="0"/>
+              <a:t>The second is </a:t>
+            </a:r>
+            <a:r>
+              <a:rPr lang="en-US" dirty="0" err="1" smtClean="0"/>
+              <a:t>pg</a:t>
+            </a:r>
+            <a:r>
+              <a:rPr lang="en-US" dirty="0" smtClean="0"/>
+              <a:t> admin/</a:t>
+            </a:r>
+            <a:r>
+              <a:rPr lang="en-US" dirty="0" err="1" smtClean="0"/>
+              <a:t>netcat</a:t>
+            </a:r>
+            <a:r>
+              <a:rPr lang="en-US" dirty="0" smtClean="0"/>
+              <a:t>/</a:t>
+            </a:r>
+            <a:r>
+              <a:rPr lang="en-US" dirty="0" err="1" smtClean="0"/>
+              <a:t>tsora</a:t>
+            </a:r>
+            <a:r>
+              <a:rPr lang="en-US" dirty="0" smtClean="0"/>
+              <a:t> tools.  A </a:t>
+            </a:r>
+            <a:r>
+              <a:rPr lang="en-US" dirty="0" err="1" smtClean="0"/>
+              <a:t>Gui</a:t>
+            </a:r>
+            <a:r>
+              <a:rPr lang="en-US" dirty="0" smtClean="0"/>
+              <a:t> basically</a:t>
+            </a:r>
+          </a:p>
+          <a:p>
+            <a:pPr fontAlgn="base"/>
+            <a:endParaRPr lang="en-US" dirty="0" smtClean="0"/>
+          </a:p>
+        </p:txBody>
+      </p:sp>
+    </p:spTree>
+    <p:extLst>
+      <p:ext uri="{BB962C8B-B14F-4D97-AF65-F5344CB8AC3E}">
+        <p14:creationId xmlns:p14="http://schemas.microsoft.com/office/powerpoint/2010/main" val="325092810"/>
+      </p:ext>
+    </p:extLst>
+  </p:cSld>
+  <p:clrMapOvr>
+    <a:masterClrMapping/>
+  </p:clrMapOvr>
+</p:sld>
+</file>
+
+<file path=ppt/slides/slide15.xml><?xml version="1.0" encoding="utf-8"?>
+<p:sld xmlns:a="http://schemas.openxmlformats.org/drawingml/2006/main" xmlns:r="http://schemas.openxmlformats.org/officeDocument/2006/relationships" xmlns:p="http://schemas.openxmlformats.org/presentationml/2006/main">
+  <p:cSld>
+    <p:spTree>
+      <p:nvGrpSpPr>
+        <p:cNvPr id="1" name=""/>
+        <p:cNvGrpSpPr/>
+        <p:nvPr/>
+      </p:nvGrpSpPr>
+      <p:grpSpPr>
+        <a:xfrm>
+          <a:off x="0" y="0"/>
+          <a:ext cx="0" cy="0"/>
+          <a:chOff x="0" y="0"/>
+          <a:chExt cx="0" cy="0"/>
+        </a:xfrm>
+      </p:grpSpPr>
+      <p:sp>
+        <p:nvSpPr>
+          <p:cNvPr id="2" name="Title 1"/>
+          <p:cNvSpPr>
+            <a:spLocks noGrp="1"/>
+          </p:cNvSpPr>
+          <p:nvPr>
+            <p:ph type="title"/>
+          </p:nvPr>
+        </p:nvSpPr>
+        <p:spPr>
+          <a:xfrm>
+            <a:off x="677334" y="0"/>
+            <a:ext cx="8596668" cy="1320800"/>
+          </a:xfrm>
+        </p:spPr>
+        <p:txBody>
+          <a:bodyPr>
+            <a:normAutofit fontScale="90000"/>
+          </a:bodyPr>
+          <a:lstStyle/>
+          <a:p>
+            <a:r>
+              <a:rPr lang="en-US" dirty="0" smtClean="0"/>
+              <a:t>Appendix – Backup – Logical Backups – All Databases</a:t>
+            </a:r>
+            <a:r>
+              <a:rPr lang="en-US" dirty="0" smtClean="0"/>
+              <a:t/>
+            </a:r>
+            <a:br>
+              <a:rPr lang="en-US" dirty="0" smtClean="0"/>
+            </a:br>
+            <a:endParaRPr lang="en-US" dirty="0"/>
+          </a:p>
+        </p:txBody>
+      </p:sp>
+      <p:sp>
+        <p:nvSpPr>
+          <p:cNvPr id="3" name="Subtitle 2"/>
+          <p:cNvSpPr>
+            <a:spLocks noGrp="1"/>
+          </p:cNvSpPr>
+          <p:nvPr>
+            <p:ph idx="1"/>
+          </p:nvPr>
+        </p:nvSpPr>
+        <p:spPr>
+          <a:xfrm>
+            <a:off x="677334" y="1219200"/>
+            <a:ext cx="9768244" cy="5461685"/>
+          </a:xfrm>
+        </p:spPr>
+        <p:txBody>
+          <a:bodyPr>
+            <a:normAutofit/>
+          </a:bodyPr>
+          <a:lstStyle/>
+          <a:p>
+            <a:pPr fontAlgn="base"/>
+            <a:r>
+              <a:rPr lang="en-US" dirty="0"/>
+              <a:t>You can use the </a:t>
+            </a:r>
+            <a:r>
+              <a:rPr lang="en-US" dirty="0" err="1"/>
+              <a:t>pg_dump</a:t>
+            </a:r>
+            <a:r>
+              <a:rPr lang="en-US" dirty="0"/>
+              <a:t> command to back up each database in the server; however, </a:t>
+            </a:r>
+            <a:r>
+              <a:rPr lang="en-US" dirty="0" err="1"/>
+              <a:t>pg_dump</a:t>
+            </a:r>
+            <a:r>
+              <a:rPr lang="en-US" dirty="0"/>
+              <a:t> does not dump information about the role definition and tablespaces. </a:t>
+            </a:r>
+            <a:endParaRPr lang="en-US" dirty="0" smtClean="0"/>
+          </a:p>
+          <a:p>
+            <a:pPr fontAlgn="base"/>
+            <a:r>
+              <a:rPr lang="en-US" dirty="0" smtClean="0"/>
+              <a:t>To </a:t>
+            </a:r>
+            <a:r>
+              <a:rPr lang="en-US" dirty="0"/>
+              <a:t>dump the global information, use the following command</a:t>
+            </a:r>
+            <a:r>
+              <a:rPr lang="en-US" dirty="0" smtClean="0"/>
+              <a:t>:</a:t>
+            </a:r>
+          </a:p>
+          <a:p>
+            <a:pPr lvl="1" fontAlgn="base"/>
+            <a:r>
+              <a:rPr lang="en-US" dirty="0" err="1" smtClean="0"/>
+              <a:t>pg_dumpall</a:t>
+            </a:r>
+            <a:r>
+              <a:rPr lang="en-US" dirty="0" smtClean="0"/>
+              <a:t> –g</a:t>
+            </a:r>
+          </a:p>
+          <a:p>
+            <a:pPr fontAlgn="base"/>
+            <a:r>
+              <a:rPr lang="en-US" dirty="0" smtClean="0"/>
+              <a:t>To </a:t>
+            </a:r>
+            <a:r>
+              <a:rPr lang="en-US" dirty="0"/>
+              <a:t>back up all the databases in one go, you can use the </a:t>
+            </a:r>
+            <a:r>
+              <a:rPr lang="en-US" dirty="0" err="1"/>
+              <a:t>pg_dumpall</a:t>
+            </a:r>
+            <a:r>
+              <a:rPr lang="en-US" dirty="0"/>
+              <a:t> utility, as follows, in Windows</a:t>
+            </a:r>
+            <a:r>
+              <a:rPr lang="en-US" dirty="0" smtClean="0"/>
+              <a:t>:</a:t>
+            </a:r>
+          </a:p>
+          <a:p>
+            <a:pPr lvl="1" fontAlgn="base"/>
+            <a:r>
+              <a:rPr lang="en-US" dirty="0" err="1" smtClean="0"/>
+              <a:t>pg_dumpall</a:t>
+            </a:r>
+            <a:r>
+              <a:rPr lang="en-US" dirty="0" smtClean="0"/>
+              <a:t> </a:t>
+            </a:r>
+            <a:r>
+              <a:rPr lang="en-US" dirty="0"/>
+              <a:t>-U </a:t>
+            </a:r>
+            <a:r>
+              <a:rPr lang="en-US" dirty="0" err="1"/>
+              <a:t>postgres</a:t>
+            </a:r>
+            <a:r>
+              <a:rPr lang="en-US" dirty="0"/>
+              <a:t> &gt; c:\</a:t>
+            </a:r>
+            <a:r>
+              <a:rPr lang="en-US" dirty="0" smtClean="0"/>
+              <a:t>pgbackup\all.sql</a:t>
+            </a:r>
+          </a:p>
+          <a:p>
+            <a:pPr fontAlgn="base"/>
+            <a:r>
+              <a:rPr lang="en-US" dirty="0" smtClean="0"/>
+              <a:t>Similarly</a:t>
+            </a:r>
+            <a:r>
+              <a:rPr lang="en-US" dirty="0"/>
+              <a:t>, to back up all the databases in one go in Linux, use the </a:t>
+            </a:r>
+            <a:r>
+              <a:rPr lang="en-US" dirty="0" err="1"/>
+              <a:t>pg_dumpall</a:t>
+            </a:r>
+            <a:r>
+              <a:rPr lang="en-US" dirty="0"/>
+              <a:t> command, as follows</a:t>
+            </a:r>
+            <a:r>
+              <a:rPr lang="en-US" dirty="0" smtClean="0"/>
+              <a:t>:</a:t>
+            </a:r>
+          </a:p>
+          <a:p>
+            <a:pPr lvl="1" fontAlgn="base"/>
+            <a:r>
+              <a:rPr lang="en-US" dirty="0" err="1" smtClean="0"/>
+              <a:t>pg_dumpall</a:t>
+            </a:r>
+            <a:r>
+              <a:rPr lang="en-US" dirty="0" smtClean="0"/>
+              <a:t> </a:t>
+            </a:r>
+            <a:r>
+              <a:rPr lang="en-US" dirty="0"/>
+              <a:t>-U </a:t>
+            </a:r>
+            <a:r>
+              <a:rPr lang="en-US" dirty="0" err="1"/>
+              <a:t>postgres</a:t>
+            </a:r>
+            <a:r>
+              <a:rPr lang="en-US" dirty="0"/>
+              <a:t> &gt;   /home/</a:t>
+            </a:r>
+            <a:r>
+              <a:rPr lang="en-US" dirty="0" err="1"/>
+              <a:t>pgbackup</a:t>
+            </a:r>
+            <a:r>
+              <a:rPr lang="en-US" dirty="0"/>
+              <a:t>/</a:t>
+            </a:r>
+            <a:r>
+              <a:rPr lang="en-US" dirty="0" err="1"/>
+              <a:t>all.sql</a:t>
+            </a:r>
+            <a:endParaRPr lang="en-US" dirty="0" smtClean="0"/>
+          </a:p>
+        </p:txBody>
+      </p:sp>
+    </p:spTree>
+    <p:extLst>
+      <p:ext uri="{BB962C8B-B14F-4D97-AF65-F5344CB8AC3E}">
+        <p14:creationId xmlns:p14="http://schemas.microsoft.com/office/powerpoint/2010/main" val="3388375658"/>
+      </p:ext>
+    </p:extLst>
+  </p:cSld>
+  <p:clrMapOvr>
+    <a:masterClrMapping/>
+  </p:clrMapOvr>
+</p:sld>
+</file>
+
+<file path=ppt/slides/slide16.xml><?xml version="1.0" encoding="utf-8"?>
+<p:sld xmlns:a="http://schemas.openxmlformats.org/drawingml/2006/main" xmlns:r="http://schemas.openxmlformats.org/officeDocument/2006/relationships" xmlns:p="http://schemas.openxmlformats.org/presentationml/2006/main">
+  <p:cSld>
+    <p:spTree>
+      <p:nvGrpSpPr>
+        <p:cNvPr id="1" name=""/>
+        <p:cNvGrpSpPr/>
+        <p:nvPr/>
+      </p:nvGrpSpPr>
+      <p:grpSpPr>
+        <a:xfrm>
+          <a:off x="0" y="0"/>
+          <a:ext cx="0" cy="0"/>
+          <a:chOff x="0" y="0"/>
+          <a:chExt cx="0" cy="0"/>
+        </a:xfrm>
+      </p:grpSpPr>
+      <p:sp>
+        <p:nvSpPr>
+          <p:cNvPr id="2" name="Title 1"/>
+          <p:cNvSpPr>
+            <a:spLocks noGrp="1"/>
+          </p:cNvSpPr>
+          <p:nvPr>
+            <p:ph type="title"/>
+          </p:nvPr>
+        </p:nvSpPr>
+        <p:spPr>
+          <a:xfrm>
+            <a:off x="677334" y="0"/>
+            <a:ext cx="8596668" cy="1320800"/>
+          </a:xfrm>
+        </p:spPr>
+        <p:txBody>
+          <a:bodyPr>
+            <a:normAutofit fontScale="90000"/>
+          </a:bodyPr>
+          <a:lstStyle/>
+          <a:p>
+            <a:r>
+              <a:rPr lang="en-US" dirty="0" smtClean="0"/>
+              <a:t>Appendix – Backup – Logical Backups – Single Object</a:t>
+            </a:r>
+            <a:r>
+              <a:rPr lang="en-US" dirty="0" smtClean="0"/>
+              <a:t/>
+            </a:r>
+            <a:br>
+              <a:rPr lang="en-US" dirty="0" smtClean="0"/>
+            </a:br>
+            <a:endParaRPr lang="en-US" dirty="0"/>
+          </a:p>
+        </p:txBody>
+      </p:sp>
+      <p:sp>
+        <p:nvSpPr>
+          <p:cNvPr id="3" name="Subtitle 2"/>
+          <p:cNvSpPr>
+            <a:spLocks noGrp="1"/>
+          </p:cNvSpPr>
+          <p:nvPr>
+            <p:ph idx="1"/>
+          </p:nvPr>
+        </p:nvSpPr>
+        <p:spPr>
+          <a:xfrm>
+            <a:off x="677334" y="1219200"/>
+            <a:ext cx="9768244" cy="5461685"/>
+          </a:xfrm>
+        </p:spPr>
+        <p:txBody>
+          <a:bodyPr>
+            <a:normAutofit/>
+          </a:bodyPr>
+          <a:lstStyle/>
+          <a:p>
+            <a:pPr fontAlgn="base"/>
+            <a:r>
+              <a:rPr lang="en-US" dirty="0"/>
+              <a:t>If you wish to back up some specific tables in a certain schema, you can use the </a:t>
+            </a:r>
+            <a:r>
+              <a:rPr lang="en-US" dirty="0" err="1"/>
+              <a:t>pg_dump</a:t>
+            </a:r>
+            <a:r>
+              <a:rPr lang="en-US" dirty="0"/>
+              <a:t> command, as follows</a:t>
+            </a:r>
+            <a:r>
+              <a:rPr lang="en-US" dirty="0" smtClean="0"/>
+              <a:t>:</a:t>
+            </a:r>
+          </a:p>
+          <a:p>
+            <a:pPr lvl="1" fontAlgn="base"/>
+            <a:r>
+              <a:rPr lang="en-US" dirty="0" err="1" smtClean="0"/>
+              <a:t>pg_dump</a:t>
+            </a:r>
+            <a:r>
+              <a:rPr lang="en-US" dirty="0" smtClean="0"/>
+              <a:t> </a:t>
+            </a:r>
+            <a:r>
+              <a:rPr lang="en-US" dirty="0"/>
+              <a:t>-h localhost -p 5432 -U </a:t>
+            </a:r>
+            <a:r>
+              <a:rPr lang="en-US" dirty="0" err="1"/>
+              <a:t>agovil</a:t>
+            </a:r>
+            <a:r>
+              <a:rPr lang="en-US" dirty="0"/>
+              <a:t> -F c -b -v -f "C:\pgbak\testdb_test.backup" -t </a:t>
+            </a:r>
+            <a:r>
+              <a:rPr lang="en-US" dirty="0" err="1"/>
+              <a:t>case.test</a:t>
+            </a:r>
+            <a:r>
+              <a:rPr lang="en-US" dirty="0"/>
+              <a:t> </a:t>
+            </a:r>
+            <a:r>
+              <a:rPr lang="en-US" dirty="0" err="1" smtClean="0"/>
+              <a:t>postgres</a:t>
+            </a:r>
+            <a:endParaRPr lang="en-US" dirty="0" smtClean="0"/>
+          </a:p>
+          <a:p>
+            <a:pPr fontAlgn="base"/>
+            <a:r>
+              <a:rPr lang="en-US" dirty="0" smtClean="0"/>
+              <a:t>In </a:t>
+            </a:r>
+            <a:r>
+              <a:rPr lang="en-US" dirty="0"/>
+              <a:t>the previous command, we are backing up a table called test, which resides in the case schema in the PostgreSQL database.</a:t>
+            </a:r>
+            <a:endParaRPr lang="en-US" dirty="0" smtClean="0"/>
+          </a:p>
+        </p:txBody>
+      </p:sp>
+    </p:spTree>
+    <p:extLst>
+      <p:ext uri="{BB962C8B-B14F-4D97-AF65-F5344CB8AC3E}">
+        <p14:creationId xmlns:p14="http://schemas.microsoft.com/office/powerpoint/2010/main" val="3534155798"/>
+      </p:ext>
+    </p:extLst>
+  </p:cSld>
+  <p:clrMapOvr>
+    <a:masterClrMapping/>
+  </p:clrMapOvr>
+</p:sld>
+</file>
+
 <file path=ppt/slides/slide2.xml><?xml version="1.0" encoding="utf-8"?>
 <p:sld xmlns:a="http://schemas.openxmlformats.org/drawingml/2006/main" xmlns:r="http://schemas.openxmlformats.org/officeDocument/2006/relationships" xmlns:p="http://schemas.openxmlformats.org/presentationml/2006/main">
   <p:cSld>
@@ -6950,36 +8299,27 @@
         <p:spPr>
           <a:xfrm>
             <a:off x="677334" y="0"/>
-            <a:ext cx="8596668" cy="1320800"/>
+            <a:ext cx="8878558" cy="1320800"/>
           </a:xfrm>
         </p:spPr>
         <p:txBody>
-          <a:bodyPr/>
-          <a:lstStyle/>
-          <a:p>
-            <a:r>
-              <a:rPr lang="en-US" dirty="0" smtClean="0"/>
-              <a:t>Day 2 </a:t>
-            </a:r>
-            <a:r>
-              <a:rPr lang="en-US" dirty="0"/>
-              <a:t>Overview - Our </a:t>
-            </a:r>
-            <a:r>
-              <a:rPr lang="en-US" dirty="0" smtClean="0"/>
-              <a:t>New </a:t>
-            </a:r>
-            <a:r>
-              <a:rPr lang="en-US" dirty="0"/>
-              <a:t>Schedule</a:t>
-            </a:r>
-            <a:r>
-              <a:rPr lang="en-US" dirty="0" smtClean="0"/>
-              <a:t/>
-            </a:r>
-            <a:br>
-              <a:rPr lang="en-US" dirty="0" smtClean="0"/>
-            </a:br>
+          <a:bodyPr>
+            <a:normAutofit/>
+          </a:bodyPr>
+          <a:lstStyle/>
+          <a:p>
+            <a:r>
+              <a:rPr lang="en-US" dirty="0" err="1" smtClean="0"/>
+              <a:t>Postgresql</a:t>
+            </a:r>
+            <a:r>
+              <a:rPr lang="en-US" dirty="0" smtClean="0"/>
+              <a:t> – </a:t>
+            </a:r>
+            <a:r>
+              <a:rPr lang="en-US" dirty="0" smtClean="0"/>
+              <a:t>Settings and Other Sundries</a:t>
+            </a:r>
             <a:endParaRPr lang="en-US" dirty="0"/>
           </a:p>
         </p:txBody>
@@ -7008,129 +8348,89 @@
           <a:p>
             <a:pPr fontAlgn="base"/>
             <a:r>
-              <a:rPr lang="en-US" dirty="0" smtClean="0"/>
-              <a:t>Configuration Options in </a:t>
+              <a:rPr lang="en-US" dirty="0">
+                <a:hlinkClick r:id="rId2"/>
+              </a:rPr>
+              <a:t>https://</a:t>
+            </a:r>
+            <a:r>
+              <a:rPr lang="en-US" dirty="0" smtClean="0">
+                <a:hlinkClick r:id="rId2"/>
+              </a:rPr>
+              <a:t>www.postgresql.org/docs/9.5/static/config-setting.html</a:t>
+            </a:r>
+            <a:endParaRPr lang="en-US" dirty="0" smtClean="0"/>
+          </a:p>
+          <a:p>
+            <a:pPr fontAlgn="base"/>
+            <a:r>
+              <a:rPr lang="en-US" dirty="0" smtClean="0"/>
+              <a:t>Manual Review of </a:t>
             </a:r>
             <a:r>
               <a:rPr lang="en-US" dirty="0" err="1" smtClean="0"/>
-              <a:t>Postgresql</a:t>
-            </a:r>
-            <a:r>
-              <a:rPr lang="en-US" dirty="0" smtClean="0"/>
-              <a:t> (</a:t>
+              <a:t>postgresql.conf</a:t>
+            </a:r>
+            <a:endParaRPr lang="en-US" dirty="0" smtClean="0"/>
+          </a:p>
+          <a:p>
+            <a:pPr fontAlgn="base"/>
+            <a:r>
+              <a:rPr lang="en-US" dirty="0" smtClean="0"/>
+              <a:t>Manual Review of RDS Parameter Groups</a:t>
+            </a:r>
+          </a:p>
+          <a:p>
+            <a:pPr fontAlgn="base"/>
+            <a:r>
+              <a:rPr lang="en-US" dirty="0">
+                <a:hlinkClick r:id="rId3"/>
+              </a:rPr>
+              <a:t>https://</a:t>
+            </a:r>
+            <a:r>
+              <a:rPr lang="en-US" dirty="0" smtClean="0">
+                <a:hlinkClick r:id="rId3"/>
+              </a:rPr>
+              <a:t>www.safaribooksonline.com/library/view/learning-postgresql/9781783989188/ch08.html</a:t>
+            </a:r>
+            <a:endParaRPr lang="en-US" dirty="0" smtClean="0"/>
+          </a:p>
+          <a:p>
+            <a:pPr fontAlgn="base"/>
+            <a:r>
+              <a:rPr lang="en-US" dirty="0" smtClean="0"/>
+              <a:t>Manual Review of </a:t>
             </a:r>
             <a:r>
               <a:rPr lang="en-US" dirty="0" err="1" smtClean="0"/>
               <a:t>pg_hba.conf</a:t>
             </a:r>
-            <a:r>
-              <a:rPr lang="en-US" dirty="0" smtClean="0"/>
-              <a:t> and </a:t>
-            </a:r>
-            <a:r>
-              <a:rPr lang="en-US" dirty="0" err="1" smtClean="0"/>
-              <a:t>postgresql.conf</a:t>
-            </a:r>
-            <a:r>
-              <a:rPr lang="en-US" dirty="0" smtClean="0"/>
-              <a:t>)</a:t>
-            </a:r>
+            <a:endParaRPr lang="en-US" dirty="0" smtClean="0"/>
           </a:p>
           <a:p>
             <a:pPr fontAlgn="base"/>
             <a:r>
               <a:rPr lang="en-US" dirty="0" smtClean="0"/>
-              <a:t>Logging and where to find logs (RDS focused)</a:t>
-            </a:r>
+              <a:t>RDS Security Groups</a:t>
+            </a:r>
+          </a:p>
+          <a:p>
+            <a:pPr fontAlgn="base"/>
             <a:endParaRPr lang="en-US" dirty="0" smtClean="0"/>
           </a:p>
           <a:p>
-            <a:pPr fontAlgn="base"/>
-            <a:r>
-              <a:rPr lang="en-US" dirty="0" smtClean="0"/>
-              <a:t>Backup and Restore</a:t>
-            </a:r>
-          </a:p>
-          <a:p>
-            <a:pPr lvl="1" fontAlgn="base"/>
-            <a:r>
-              <a:rPr lang="en-US" dirty="0" smtClean="0"/>
-              <a:t>Generic</a:t>
-            </a:r>
-          </a:p>
-          <a:p>
-            <a:pPr lvl="1" fontAlgn="base"/>
-            <a:r>
-              <a:rPr lang="en-US" dirty="0" smtClean="0"/>
-              <a:t>PITR</a:t>
-            </a:r>
-          </a:p>
-          <a:p>
-            <a:pPr fontAlgn="base"/>
-            <a:r>
-              <a:rPr lang="en-US" dirty="0" smtClean="0"/>
-              <a:t>Client Tips and Tricks </a:t>
-            </a:r>
-          </a:p>
-          <a:p>
-            <a:pPr lvl="1" fontAlgn="base"/>
-            <a:r>
-              <a:rPr lang="en-US" dirty="0" smtClean="0"/>
-              <a:t>PSQL</a:t>
-            </a:r>
-          </a:p>
-          <a:p>
-            <a:pPr lvl="1" fontAlgn="base"/>
-            <a:r>
-              <a:rPr lang="en-US" dirty="0" smtClean="0"/>
-              <a:t>PGADMIN 3 (talk about 4)</a:t>
-            </a:r>
-          </a:p>
-          <a:p>
-            <a:pPr fontAlgn="base"/>
-            <a:r>
-              <a:rPr lang="en-US" dirty="0" smtClean="0"/>
-              <a:t>Labs:</a:t>
-            </a:r>
-          </a:p>
-          <a:p>
-            <a:pPr lvl="1" fontAlgn="base"/>
-            <a:r>
-              <a:rPr lang="en-US" dirty="0" smtClean="0"/>
-              <a:t>Changing Options in Configuration</a:t>
-            </a:r>
-          </a:p>
-          <a:p>
-            <a:pPr lvl="1" fontAlgn="base"/>
-            <a:r>
-              <a:rPr lang="en-US" dirty="0" smtClean="0"/>
-              <a:t>Reading and Tracking Logs</a:t>
-            </a:r>
-          </a:p>
-          <a:p>
-            <a:pPr lvl="1" fontAlgn="base"/>
-            <a:r>
-              <a:rPr lang="en-US" dirty="0" smtClean="0"/>
-              <a:t>Backups and Restoration (big lab)</a:t>
-            </a:r>
-          </a:p>
-          <a:p>
-            <a:pPr lvl="1" fontAlgn="base"/>
-            <a:r>
-              <a:rPr lang="en-US" dirty="0" smtClean="0"/>
-              <a:t>PSQL </a:t>
-            </a:r>
-            <a:r>
-              <a:rPr lang="en-US" dirty="0"/>
-              <a:t>tips and tricks (big lab)</a:t>
-            </a:r>
+            <a:pPr marL="0" indent="0" fontAlgn="base">
+              <a:buNone/>
+            </a:pPr>
+            <a:endParaRPr lang="en-US" dirty="0"/>
           </a:p>
         </p:txBody>
       </p:sp>
     </p:spTree>
     <p:extLst>
       <p:ext uri="{BB962C8B-B14F-4D97-AF65-F5344CB8AC3E}">
-        <p14:creationId xmlns:p14="http://schemas.microsoft.com/office/powerpoint/2010/main" val="2928651007"/>
+        <p14:creationId xmlns:p14="http://schemas.microsoft.com/office/powerpoint/2010/main" val="2438168871"/>
       </p:ext>
     </p:extLst>
   </p:cSld>
@@ -7177,20 +8477,27 @@
         <p:spPr>
           <a:xfrm>
             <a:off x="677334" y="0"/>
-            <a:ext cx="8596668" cy="1320800"/>
+            <a:ext cx="8878558" cy="1320800"/>
           </a:xfrm>
         </p:spPr>
         <p:txBody>
-          <a:bodyPr/>
-          <a:lstStyle/>
-          <a:p>
-            <a:r>
-              <a:rPr lang="en-US" dirty="0" smtClean="0"/>
-              <a:t>Appendix</a:t>
-            </a:r>
-            <a:br>
-              <a:rPr lang="en-US" dirty="0" smtClean="0"/>
-            </a:br>
+          <a:bodyPr>
+            <a:normAutofit/>
+          </a:bodyPr>
+          <a:lstStyle/>
+          <a:p>
+            <a:r>
+              <a:rPr lang="en-US" dirty="0" err="1" smtClean="0"/>
+              <a:t>Postgresql</a:t>
+            </a:r>
+            <a:r>
+              <a:rPr lang="en-US" dirty="0" smtClean="0"/>
+              <a:t> – </a:t>
+            </a:r>
+            <a:r>
+              <a:rPr lang="en-US" dirty="0" smtClean="0"/>
+              <a:t>Settings and Other Sundries</a:t>
+            </a:r>
             <a:endParaRPr lang="en-US" dirty="0"/>
           </a:p>
         </p:txBody>
@@ -7218,6 +8525,82 @@
           <a:lstStyle/>
           <a:p>
             <a:pPr fontAlgn="base"/>
+            <a:r>
+              <a:rPr lang="en-US" dirty="0">
+                <a:hlinkClick r:id="rId2"/>
+              </a:rPr>
+              <a:t>https://</a:t>
+            </a:r>
+            <a:r>
+              <a:rPr lang="en-US" dirty="0" smtClean="0">
+                <a:hlinkClick r:id="rId2"/>
+              </a:rPr>
+              <a:t>www.postgresql.org/docs/9.5/static/config-setting.html</a:t>
+            </a:r>
+            <a:endParaRPr lang="en-US" dirty="0" smtClean="0"/>
+          </a:p>
+          <a:p>
+            <a:pPr fontAlgn="base"/>
+            <a:r>
+              <a:rPr lang="en-US" dirty="0" smtClean="0"/>
+              <a:t>Manual Review of </a:t>
+            </a:r>
+            <a:r>
+              <a:rPr lang="en-US" dirty="0" err="1" smtClean="0"/>
+              <a:t>postgresql.conf</a:t>
+            </a:r>
+            <a:endParaRPr lang="en-US" dirty="0" smtClean="0"/>
+          </a:p>
+          <a:p>
+            <a:pPr fontAlgn="base"/>
+            <a:r>
+              <a:rPr lang="en-US" dirty="0" smtClean="0"/>
+              <a:t>Manual Review of RDS Parameter Groups</a:t>
+            </a:r>
+          </a:p>
+          <a:p>
+            <a:pPr fontAlgn="base"/>
+            <a:r>
+              <a:rPr lang="en-US" dirty="0">
+                <a:hlinkClick r:id="rId3"/>
+              </a:rPr>
+              <a:t>https://</a:t>
+            </a:r>
+            <a:r>
+              <a:rPr lang="en-US" dirty="0" smtClean="0">
+                <a:hlinkClick r:id="rId3"/>
+              </a:rPr>
+              <a:t>www.safaribooksonline.com/library/view/learning-postgresql/9781783989188/ch08.html</a:t>
+            </a:r>
+            <a:endParaRPr lang="en-US" dirty="0" smtClean="0"/>
+          </a:p>
+          <a:p>
+            <a:pPr fontAlgn="base"/>
+            <a:r>
+              <a:rPr lang="en-US" dirty="0" smtClean="0"/>
+              <a:t>Manual Review of </a:t>
+            </a:r>
+            <a:r>
+              <a:rPr lang="en-US" dirty="0" err="1" smtClean="0"/>
+              <a:t>pg_hba.conf</a:t>
+            </a:r>
+            <a:endParaRPr lang="en-US" dirty="0" smtClean="0"/>
+          </a:p>
+          <a:p>
+            <a:pPr fontAlgn="base"/>
+            <a:r>
+              <a:rPr lang="en-US" dirty="0" smtClean="0"/>
+              <a:t>RDS Security Groups</a:t>
+            </a:r>
+          </a:p>
+          <a:p>
+            <a:pPr fontAlgn="base"/>
+            <a:endParaRPr lang="en-US" dirty="0" smtClean="0"/>
+          </a:p>
+          <a:p>
+            <a:pPr marL="0" indent="0" fontAlgn="base">
+              <a:buNone/>
+            </a:pPr>
             <a:endParaRPr lang="en-US" dirty="0"/>
           </a:p>
         </p:txBody>
@@ -7225,13 +8608,284 @@
     </p:spTree>
     <p:extLst>
       <p:ext uri="{BB962C8B-B14F-4D97-AF65-F5344CB8AC3E}">
-        <p14:creationId xmlns:p14="http://schemas.microsoft.com/office/powerpoint/2010/main" val="526200546"/>
+        <p14:creationId xmlns:p14="http://schemas.microsoft.com/office/powerpoint/2010/main" val="3277216950"/>
       </p:ext>
     </p:extLst>
   </p:cSld>
   <p:clrMapOvr>
     <a:masterClrMapping/>
   </p:clrMapOvr>
+  <p:timing>
+    <p:tnLst>
+      <p:par>
+        <p:cTn id="1" dur="indefinite" restart="never" nodeType="tmRoot"/>
+      </p:par>
+    </p:tnLst>
+  </p:timing>
+</p:sld>
+</file>
+
+<file path=ppt/slides/slide8.xml><?xml version="1.0" encoding="utf-8"?>
+<p:sld xmlns:a="http://schemas.openxmlformats.org/drawingml/2006/main" xmlns:r="http://schemas.openxmlformats.org/officeDocument/2006/relationships" xmlns:p="http://schemas.openxmlformats.org/presentationml/2006/main">
+  <p:cSld>
+    <p:spTree>
+      <p:nvGrpSpPr>
+        <p:cNvPr id="1" name=""/>
+        <p:cNvGrpSpPr/>
+        <p:nvPr/>
+      </p:nvGrpSpPr>
+      <p:grpSpPr>
+        <a:xfrm>
+          <a:off x="0" y="0"/>
+          <a:ext cx="0" cy="0"/>
+          <a:chOff x="0" y="0"/>
+          <a:chExt cx="0" cy="0"/>
+        </a:xfrm>
+      </p:grpSpPr>
+      <p:sp>
+        <p:nvSpPr>
+          <p:cNvPr id="2" name="Title 1"/>
+          <p:cNvSpPr>
+            <a:spLocks noGrp="1"/>
+          </p:cNvSpPr>
+          <p:nvPr>
+            <p:ph type="title"/>
+          </p:nvPr>
+        </p:nvSpPr>
+        <p:spPr>
+          <a:xfrm>
+            <a:off x="677334" y="0"/>
+            <a:ext cx="8878558" cy="1320800"/>
+          </a:xfrm>
+        </p:spPr>
+        <p:txBody>
+          <a:bodyPr>
+            <a:normAutofit/>
+          </a:bodyPr>
+          <a:lstStyle/>
+          <a:p>
+            <a:r>
+              <a:rPr lang="en-US" dirty="0" smtClean="0"/>
+              <a:t>Logging and Getting Information</a:t>
+            </a:r>
+            <a:endParaRPr lang="en-US" dirty="0"/>
+          </a:p>
+        </p:txBody>
+      </p:sp>
+      <p:sp>
+        <p:nvSpPr>
+          <p:cNvPr id="3" name="Subtitle 2"/>
+          <p:cNvSpPr>
+            <a:spLocks noGrp="1"/>
+          </p:cNvSpPr>
+          <p:nvPr>
+            <p:ph idx="1"/>
+          </p:nvPr>
+        </p:nvSpPr>
+        <p:spPr>
+          <a:xfrm>
+            <a:off x="677334" y="1219200"/>
+            <a:ext cx="9768244" cy="5461685"/>
+          </a:xfrm>
+        </p:spPr>
+        <p:txBody>
+          <a:bodyPr>
+            <a:normAutofit/>
+          </a:bodyPr>
+          <a:lstStyle/>
+          <a:p>
+            <a:pPr fontAlgn="base"/>
+            <a:r>
+              <a:rPr lang="en-US" dirty="0">
+                <a:hlinkClick r:id="rId2"/>
+              </a:rPr>
+              <a:t>https://</a:t>
+            </a:r>
+            <a:r>
+              <a:rPr lang="en-US" dirty="0" smtClean="0">
+                <a:hlinkClick r:id="rId2"/>
+              </a:rPr>
+              <a:t>www.safaribooksonline.com/library/view/postgresql-9-administration/9781849519069/ch02s05.html</a:t>
+            </a:r>
+            <a:endParaRPr lang="en-US" dirty="0" smtClean="0"/>
+          </a:p>
+          <a:p>
+            <a:pPr fontAlgn="base"/>
+            <a:r>
+              <a:rPr lang="en-US" dirty="0">
+                <a:hlinkClick r:id="rId3"/>
+              </a:rPr>
+              <a:t>https://</a:t>
+            </a:r>
+            <a:r>
+              <a:rPr lang="en-US" dirty="0" smtClean="0">
+                <a:hlinkClick r:id="rId3"/>
+              </a:rPr>
+              <a:t>www.safaribooksonline.com/library/view/learning-postgresql/9781783989188/ch09.html</a:t>
+            </a:r>
+            <a:endParaRPr lang="en-US" dirty="0" smtClean="0"/>
+          </a:p>
+          <a:p>
+            <a:pPr fontAlgn="base"/>
+            <a:r>
+              <a:rPr lang="en-US" dirty="0">
+                <a:hlinkClick r:id="rId4"/>
+              </a:rPr>
+              <a:t>https://</a:t>
+            </a:r>
+            <a:r>
+              <a:rPr lang="en-US" dirty="0" smtClean="0">
+                <a:hlinkClick r:id="rId4"/>
+              </a:rPr>
+              <a:t>www.safaribooksonline.com/library/view/postgresql-for-data/9781783288601/ch02s07.html</a:t>
+            </a:r>
+            <a:endParaRPr lang="en-US" dirty="0" smtClean="0"/>
+          </a:p>
+          <a:p>
+            <a:pPr fontAlgn="base"/>
+            <a:endParaRPr lang="en-US" dirty="0" smtClean="0"/>
+          </a:p>
+          <a:p>
+            <a:pPr marL="0" indent="0" fontAlgn="base">
+              <a:buNone/>
+            </a:pPr>
+            <a:endParaRPr lang="en-US" dirty="0"/>
+          </a:p>
+        </p:txBody>
+      </p:sp>
+    </p:spTree>
+    <p:extLst>
+      <p:ext uri="{BB962C8B-B14F-4D97-AF65-F5344CB8AC3E}">
+        <p14:creationId xmlns:p14="http://schemas.microsoft.com/office/powerpoint/2010/main" val="1284679253"/>
+      </p:ext>
+    </p:extLst>
+  </p:cSld>
+  <p:clrMapOvr>
+    <a:masterClrMapping/>
+  </p:clrMapOvr>
+  <p:timing>
+    <p:tnLst>
+      <p:par>
+        <p:cTn id="1" dur="indefinite" restart="never" nodeType="tmRoot"/>
+      </p:par>
+    </p:tnLst>
+  </p:timing>
+</p:sld>
+</file>
+
+<file path=ppt/slides/slide9.xml><?xml version="1.0" encoding="utf-8"?>
+<p:sld xmlns:a="http://schemas.openxmlformats.org/drawingml/2006/main" xmlns:r="http://schemas.openxmlformats.org/officeDocument/2006/relationships" xmlns:p="http://schemas.openxmlformats.org/presentationml/2006/main">
+  <p:cSld>
+    <p:spTree>
+      <p:nvGrpSpPr>
+        <p:cNvPr id="1" name=""/>
+        <p:cNvGrpSpPr/>
+        <p:nvPr/>
+      </p:nvGrpSpPr>
+      <p:grpSpPr>
+        <a:xfrm>
+          <a:off x="0" y="0"/>
+          <a:ext cx="0" cy="0"/>
+          <a:chOff x="0" y="0"/>
+          <a:chExt cx="0" cy="0"/>
+        </a:xfrm>
+      </p:grpSpPr>
+      <p:sp>
+        <p:nvSpPr>
+          <p:cNvPr id="2" name="Title 1"/>
+          <p:cNvSpPr>
+            <a:spLocks noGrp="1"/>
+          </p:cNvSpPr>
+          <p:nvPr>
+            <p:ph type="title"/>
+          </p:nvPr>
+        </p:nvSpPr>
+        <p:spPr>
+          <a:xfrm>
+            <a:off x="677334" y="0"/>
+            <a:ext cx="8878558" cy="1320800"/>
+          </a:xfrm>
+        </p:spPr>
+        <p:txBody>
+          <a:bodyPr>
+            <a:normAutofit/>
+          </a:bodyPr>
+          <a:lstStyle/>
+          <a:p>
+            <a:r>
+              <a:rPr lang="en-US" dirty="0" smtClean="0"/>
+              <a:t>Backup and Restore</a:t>
+            </a:r>
+            <a:endParaRPr lang="en-US" dirty="0"/>
+          </a:p>
+        </p:txBody>
+      </p:sp>
+      <p:sp>
+        <p:nvSpPr>
+          <p:cNvPr id="3" name="Subtitle 2"/>
+          <p:cNvSpPr>
+            <a:spLocks noGrp="1"/>
+          </p:cNvSpPr>
+          <p:nvPr>
+            <p:ph idx="1"/>
+          </p:nvPr>
+        </p:nvSpPr>
+        <p:spPr>
+          <a:xfrm>
+            <a:off x="677334" y="1219200"/>
+            <a:ext cx="9768244" cy="5461685"/>
+          </a:xfrm>
+        </p:spPr>
+        <p:txBody>
+          <a:bodyPr>
+            <a:normAutofit/>
+          </a:bodyPr>
+          <a:lstStyle/>
+          <a:p>
+            <a:pPr fontAlgn="base"/>
+            <a:r>
+              <a:rPr lang="en-US" dirty="0">
+                <a:hlinkClick r:id="rId2"/>
+              </a:rPr>
+              <a:t>https://</a:t>
+            </a:r>
+            <a:r>
+              <a:rPr lang="en-US" dirty="0" smtClean="0">
+                <a:hlinkClick r:id="rId2"/>
+              </a:rPr>
+              <a:t>www.safaribooksonline.com/library/view/troubleshooting-postgresql/9781783555314/ch08.html</a:t>
+            </a:r>
+            <a:endParaRPr lang="en-US" dirty="0" smtClean="0"/>
+          </a:p>
+          <a:p>
+            <a:pPr fontAlgn="base"/>
+            <a:endParaRPr lang="en-US" dirty="0" smtClean="0"/>
+          </a:p>
+          <a:p>
+            <a:pPr marL="0" indent="0" fontAlgn="base">
+              <a:buNone/>
+            </a:pPr>
+            <a:endParaRPr lang="en-US" dirty="0"/>
+          </a:p>
+        </p:txBody>
+      </p:sp>
+    </p:spTree>
+    <p:extLst>
+      <p:ext uri="{BB962C8B-B14F-4D97-AF65-F5344CB8AC3E}">
+        <p14:creationId xmlns:p14="http://schemas.microsoft.com/office/powerpoint/2010/main" val="1289870151"/>
+      </p:ext>
+    </p:extLst>
+  </p:cSld>
+  <p:clrMapOvr>
+    <a:masterClrMapping/>
+  </p:clrMapOvr>
+  <p:timing>
+    <p:tnLst>
+      <p:par>
+        <p:cTn id="1" dur="indefinite" restart="never" nodeType="tmRoot"/>
+      </p:par>
+    </p:tnLst>
+  </p:timing>
 </p:sld>
 </file>
 

</xml_diff>

<commit_message>
Changed Vagrant to be in the Vagrant directory and blocked all logs and .vagrant capture
</commit_message>
<xml_diff>
--- a/Presentations/Postgresql Presentation Day 2.pptx
+++ b/Presentations/Postgresql Presentation Day 2.pptx
@@ -5,7 +5,7 @@
     <p:sldMasterId id="2147483668" r:id="rId1"/>
   </p:sldMasterIdLst>
   <p:handoutMasterIdLst>
-    <p:handoutMasterId r:id="rId18"/>
+    <p:handoutMasterId r:id="rId17"/>
   </p:handoutMasterIdLst>
   <p:sldIdLst>
     <p:sldId id="257" r:id="rId2"/>
@@ -14,16 +14,15 @@
     <p:sldId id="291" r:id="rId5"/>
     <p:sldId id="290" r:id="rId6"/>
     <p:sldId id="293" r:id="rId7"/>
-    <p:sldId id="294" r:id="rId8"/>
-    <p:sldId id="295" r:id="rId9"/>
-    <p:sldId id="296" r:id="rId10"/>
-    <p:sldId id="297" r:id="rId11"/>
-    <p:sldId id="285" r:id="rId12"/>
-    <p:sldId id="298" r:id="rId13"/>
-    <p:sldId id="299" r:id="rId14"/>
-    <p:sldId id="300" r:id="rId15"/>
-    <p:sldId id="301" r:id="rId16"/>
-    <p:sldId id="302" r:id="rId17"/>
+    <p:sldId id="295" r:id="rId8"/>
+    <p:sldId id="296" r:id="rId9"/>
+    <p:sldId id="297" r:id="rId10"/>
+    <p:sldId id="285" r:id="rId11"/>
+    <p:sldId id="298" r:id="rId12"/>
+    <p:sldId id="299" r:id="rId13"/>
+    <p:sldId id="300" r:id="rId14"/>
+    <p:sldId id="301" r:id="rId15"/>
+    <p:sldId id="302" r:id="rId16"/>
   </p:sldIdLst>
   <p:sldSz cx="12192000" cy="6858000"/>
   <p:notesSz cx="6858000" cy="9144000"/>
@@ -6149,19 +6148,20 @@
         <p:spPr>
           <a:xfrm>
             <a:off x="677334" y="0"/>
-            <a:ext cx="8878558" cy="1320800"/>
+            <a:ext cx="8596668" cy="1320800"/>
           </a:xfrm>
         </p:spPr>
         <p:txBody>
-          <a:bodyPr>
-            <a:normAutofit/>
-          </a:bodyPr>
-          <a:lstStyle/>
-          <a:p>
-            <a:r>
-              <a:rPr lang="en-US" dirty="0" smtClean="0"/>
-              <a:t>Client Tools</a:t>
-            </a:r>
+          <a:bodyPr/>
+          <a:lstStyle/>
+          <a:p>
+            <a:r>
+              <a:rPr lang="en-US" dirty="0" smtClean="0"/>
+              <a:t>Appendix</a:t>
+            </a:r>
+            <a:br>
+              <a:rPr lang="en-US" dirty="0" smtClean="0"/>
+            </a:br>
             <a:endParaRPr lang="en-US" dirty="0"/>
           </a:p>
         </p:txBody>
@@ -6189,62 +6189,6 @@
           <a:lstStyle/>
           <a:p>
             <a:pPr fontAlgn="base"/>
-            <a:r>
-              <a:rPr lang="en-US" dirty="0">
-                <a:hlinkClick r:id="rId2"/>
-              </a:rPr>
-              <a:t>https://</a:t>
-            </a:r>
-            <a:r>
-              <a:rPr lang="en-US" dirty="0" smtClean="0">
-                <a:hlinkClick r:id="rId2"/>
-              </a:rPr>
-              <a:t>www.safaribooksonline.com/library/view/postgresql-for-data/9781783288601/ch06.html</a:t>
-            </a:r>
-            <a:endParaRPr lang="en-US" dirty="0" smtClean="0"/>
-          </a:p>
-          <a:p>
-            <a:pPr fontAlgn="base"/>
-            <a:r>
-              <a:rPr lang="en-US" dirty="0" err="1" smtClean="0"/>
-              <a:t>Psql</a:t>
-            </a:r>
-            <a:endParaRPr lang="en-US" dirty="0" smtClean="0"/>
-          </a:p>
-          <a:p>
-            <a:pPr fontAlgn="base"/>
-            <a:r>
-              <a:rPr lang="en-US" dirty="0" err="1" smtClean="0"/>
-              <a:t>Pgadmin</a:t>
-            </a:r>
-            <a:r>
-              <a:rPr lang="en-US" dirty="0" smtClean="0"/>
-              <a:t> 3</a:t>
-            </a:r>
-          </a:p>
-          <a:p>
-            <a:pPr fontAlgn="base"/>
-            <a:r>
-              <a:rPr lang="en-US" dirty="0" err="1" smtClean="0"/>
-              <a:t>Pgadmin</a:t>
-            </a:r>
-            <a:r>
-              <a:rPr lang="en-US" dirty="0" smtClean="0"/>
-              <a:t> 4</a:t>
-            </a:r>
-          </a:p>
-          <a:p>
-            <a:pPr fontAlgn="base"/>
-            <a:endParaRPr lang="en-US" dirty="0" smtClean="0"/>
-          </a:p>
-          <a:p>
-            <a:pPr fontAlgn="base"/>
-            <a:endParaRPr lang="en-US" dirty="0" smtClean="0"/>
-          </a:p>
-          <a:p>
-            <a:pPr marL="0" indent="0" fontAlgn="base">
-              <a:buNone/>
-            </a:pPr>
             <a:endParaRPr lang="en-US" dirty="0"/>
           </a:p>
         </p:txBody>
@@ -6252,20 +6196,13 @@
     </p:spTree>
     <p:extLst>
       <p:ext uri="{BB962C8B-B14F-4D97-AF65-F5344CB8AC3E}">
-        <p14:creationId xmlns:p14="http://schemas.microsoft.com/office/powerpoint/2010/main" val="601706753"/>
+        <p14:creationId xmlns:p14="http://schemas.microsoft.com/office/powerpoint/2010/main" val="526200546"/>
       </p:ext>
     </p:extLst>
   </p:cSld>
   <p:clrMapOvr>
     <a:masterClrMapping/>
   </p:clrMapOvr>
-  <p:timing>
-    <p:tnLst>
-      <p:par>
-        <p:cTn id="1" dur="indefinite" restart="never" nodeType="tmRoot"/>
-      </p:par>
-    </p:tnLst>
-  </p:timing>
 </p:sld>
 </file>
 
@@ -6308,7 +6245,7 @@
           <a:p>
             <a:r>
               <a:rPr lang="en-US" dirty="0" smtClean="0"/>
-              <a:t>Appendix</a:t>
+              <a:t>Appendix – Backup And Recovery - Intro</a:t>
             </a:r>
             <a:br>
               <a:rPr lang="en-US" dirty="0" smtClean="0"/>
@@ -6340,14 +6277,69 @@
           <a:lstStyle/>
           <a:p>
             <a:pPr fontAlgn="base"/>
-            <a:endParaRPr lang="en-US" dirty="0"/>
+            <a:r>
+              <a:rPr lang="en-US" dirty="0"/>
+              <a:t>Backup and recovery usually refers to protecting the database against the loss of data and enables the restoration of data in the event of a data loss. A backup, in simple terms, is a copy of your database data.</a:t>
+            </a:r>
+          </a:p>
+          <a:p>
+            <a:pPr fontAlgn="base"/>
+            <a:endParaRPr lang="en-US" dirty="0"/>
+          </a:p>
+          <a:p>
+            <a:pPr fontAlgn="base"/>
+            <a:r>
+              <a:rPr lang="en-US" dirty="0"/>
+              <a:t>Backups are divided into two components:</a:t>
+            </a:r>
+          </a:p>
+          <a:p>
+            <a:pPr fontAlgn="base"/>
+            <a:endParaRPr lang="en-US" dirty="0"/>
+          </a:p>
+          <a:p>
+            <a:pPr lvl="1" fontAlgn="base"/>
+            <a:r>
+              <a:rPr lang="en-US" dirty="0"/>
+              <a:t>Logical backups: A logical backup refers to the dump file that is created by the </a:t>
+            </a:r>
+            <a:r>
+              <a:rPr lang="en-US" dirty="0" err="1"/>
+              <a:t>pg_dump</a:t>
+            </a:r>
+            <a:r>
+              <a:rPr lang="en-US" dirty="0"/>
+              <a:t> utility and which might be used to restore the database in the case of a data loss or an accidental deletion of a database object, such as a table. The </a:t>
+            </a:r>
+            <a:r>
+              <a:rPr lang="en-US" dirty="0" err="1"/>
+              <a:t>pg_dump</a:t>
+            </a:r>
+            <a:r>
+              <a:rPr lang="en-US" dirty="0"/>
+              <a:t> utility is a PostgreSQL specific utility that can be run on the command line, which makes a connection to the database and initiates the logical backup.</a:t>
+            </a:r>
+          </a:p>
+          <a:p>
+            <a:pPr lvl="1" fontAlgn="base"/>
+            <a:r>
+              <a:rPr lang="en-US" dirty="0"/>
+              <a:t>Physical backups: A physical backup refers to the OS level backup of a database directory and its associated files.</a:t>
+            </a:r>
+          </a:p>
+          <a:p>
+            <a:pPr fontAlgn="base"/>
+            <a:r>
+              <a:rPr lang="en-US" dirty="0"/>
+              <a:t>It is essential to have a planning strategy in order to implement backups. This is desirable from the point of view of a recovery scenario, and in the event of such a situation arising, the type of backups that we initiate will influence the type of recovery that is possible.</a:t>
+            </a:r>
           </a:p>
         </p:txBody>
       </p:sp>
     </p:spTree>
     <p:extLst>
       <p:ext uri="{BB962C8B-B14F-4D97-AF65-F5344CB8AC3E}">
-        <p14:creationId xmlns:p14="http://schemas.microsoft.com/office/powerpoint/2010/main" val="526200546"/>
+        <p14:creationId xmlns:p14="http://schemas.microsoft.com/office/powerpoint/2010/main" val="917579460"/>
       </p:ext>
     </p:extLst>
   </p:cSld>
@@ -6391,16 +6383,14 @@
           </a:xfrm>
         </p:spPr>
         <p:txBody>
-          <a:bodyPr/>
-          <a:lstStyle/>
-          <a:p>
-            <a:r>
-              <a:rPr lang="en-US" dirty="0" smtClean="0"/>
-              <a:t>Appendix – Backup And Recovery - Intro</a:t>
-            </a:r>
-            <a:r>
-              <a:rPr lang="en-US" dirty="0" smtClean="0"/>
-              <a:t/>
+          <a:bodyPr>
+            <a:normAutofit fontScale="90000"/>
+          </a:bodyPr>
+          <a:lstStyle/>
+          <a:p>
+            <a:r>
+              <a:rPr lang="en-US" dirty="0" smtClean="0"/>
+              <a:t>Appendix – Backup – Logical Backups – Getting Ready</a:t>
             </a:r>
             <a:br>
               <a:rPr lang="en-US" dirty="0" smtClean="0"/>
@@ -6434,29 +6424,15 @@
             <a:pPr fontAlgn="base"/>
             <a:r>
               <a:rPr lang="en-US" dirty="0"/>
-              <a:t>Backup and recovery usually refers to protecting the database against the loss of data and enables the restoration of data in the event of a data loss. A backup, in simple terms, is a copy of your database data.</a:t>
-            </a:r>
-          </a:p>
-          <a:p>
-            <a:pPr fontAlgn="base"/>
-            <a:endParaRPr lang="en-US" dirty="0"/>
-          </a:p>
-          <a:p>
-            <a:pPr fontAlgn="base"/>
+              <a:t>Please note that the dump keyword is evenly used here as a synonym for </a:t>
+            </a:r>
+            <a:r>
+              <a:rPr lang="en-US" dirty="0" err="1"/>
+              <a:t>backup.The</a:t>
+            </a:r>
             <a:r>
               <a:rPr lang="en-US" dirty="0"/>
-              <a:t>Backups are divided into two components:</a:t>
-            </a:r>
-          </a:p>
-          <a:p>
-            <a:pPr fontAlgn="base"/>
-            <a:endParaRPr lang="en-US" dirty="0"/>
-          </a:p>
-          <a:p>
-            <a:pPr lvl="1" fontAlgn="base"/>
-            <a:r>
-              <a:rPr lang="en-US" dirty="0"/>
-              <a:t>Logical backups: A logical backup refers to the dump file that is created by the </a:t>
+              <a:t> </a:t>
             </a:r>
             <a:r>
               <a:rPr lang="en-US" dirty="0" err="1"/>
@@ -6464,7 +6440,64 @@
             </a:r>
             <a:r>
               <a:rPr lang="en-US" dirty="0"/>
-              <a:t> utility and which might be used to restore the database in the case of a data loss or an accidental deletion of a database object, such as a table. The </a:t>
+              <a:t> utility is considered to be a logical backup because it makes a copy of the data in the database by dumping out the contents of each table</a:t>
+            </a:r>
+            <a:r>
+              <a:rPr lang="en-US" dirty="0" smtClean="0"/>
+              <a:t>.</a:t>
+            </a:r>
+          </a:p>
+          <a:p>
+            <a:pPr fontAlgn="base"/>
+            <a:r>
+              <a:rPr lang="en-US" dirty="0" smtClean="0"/>
+              <a:t>The </a:t>
+            </a:r>
+            <a:r>
+              <a:rPr lang="en-US" dirty="0"/>
+              <a:t>basic syntax to take a logical backup of a single database is mentioned here</a:t>
+            </a:r>
+            <a:r>
+              <a:rPr lang="en-US" dirty="0" smtClean="0"/>
+              <a:t>:</a:t>
+            </a:r>
+          </a:p>
+          <a:p>
+            <a:pPr lvl="1" fontAlgn="base"/>
+            <a:r>
+              <a:rPr lang="en-US" dirty="0" err="1" smtClean="0"/>
+              <a:t>pg_dump</a:t>
+            </a:r>
+            <a:r>
+              <a:rPr lang="en-US" dirty="0" smtClean="0"/>
+              <a:t> </a:t>
+            </a:r>
+            <a:r>
+              <a:rPr lang="en-US" dirty="0"/>
+              <a:t>-U username -W -F t </a:t>
+            </a:r>
+            <a:r>
+              <a:rPr lang="en-US" dirty="0" err="1"/>
+              <a:t>database_name</a:t>
+            </a:r>
+            <a:r>
+              <a:rPr lang="en-US" dirty="0"/>
+              <a:t> &gt; [Backup Location Path</a:t>
+            </a:r>
+            <a:r>
+              <a:rPr lang="en-US" dirty="0" smtClean="0"/>
+              <a:t>]</a:t>
+            </a:r>
+          </a:p>
+          <a:p>
+            <a:pPr fontAlgn="base"/>
+            <a:r>
+              <a:rPr lang="en-US" dirty="0" smtClean="0"/>
+              <a:t>The </a:t>
+            </a:r>
+            <a:r>
+              <a:rPr lang="en-US" dirty="0"/>
+              <a:t>usage of the options used with the </a:t>
             </a:r>
             <a:r>
               <a:rPr lang="en-US" dirty="0" err="1"/>
@@ -6472,30 +6505,115 @@
             </a:r>
             <a:r>
               <a:rPr lang="en-US" dirty="0"/>
-              <a:t> utility is a PostgreSQL specific utility that can be run on the command line, which makes a connection to the database and initiates the logical backup.</a:t>
+              <a:t> command is explained here</a:t>
+            </a:r>
+            <a:r>
+              <a:rPr lang="en-US" dirty="0" smtClean="0"/>
+              <a:t>:</a:t>
             </a:r>
           </a:p>
           <a:p>
             <a:pPr lvl="1" fontAlgn="base"/>
             <a:r>
+              <a:rPr lang="en-US" dirty="0" smtClean="0"/>
+              <a:t>U </a:t>
+            </a:r>
+            <a:r>
               <a:rPr lang="en-US" dirty="0"/>
-              <a:t>Physical backups: A physical backup refers to the OS level backup of a database directory and its associated files.</a:t>
+              <a:t>switch: The -U switch specifies the database user initiating the connection. As </a:t>
+            </a:r>
+            <a:r>
+              <a:rPr lang="en-US" dirty="0" err="1"/>
+              <a:t>pg_dump</a:t>
+            </a:r>
+            <a:r>
+              <a:rPr lang="en-US" dirty="0"/>
+              <a:t> is a command-line utility, we need to specify the username via which the </a:t>
+            </a:r>
+            <a:r>
+              <a:rPr lang="en-US" dirty="0" err="1"/>
+              <a:t>pg_dump</a:t>
+            </a:r>
+            <a:r>
+              <a:rPr lang="en-US" dirty="0"/>
+              <a:t> utility can make a database connection</a:t>
+            </a:r>
+            <a:r>
+              <a:rPr lang="en-US" dirty="0" smtClean="0"/>
+              <a:t>.</a:t>
+            </a:r>
+          </a:p>
+          <a:p>
+            <a:pPr lvl="1" fontAlgn="base"/>
+            <a:r>
+              <a:rPr lang="en-US" dirty="0" smtClean="0"/>
+              <a:t>W </a:t>
+            </a:r>
+            <a:r>
+              <a:rPr lang="en-US" dirty="0"/>
+              <a:t>switch: This option is not mandatory. This option forces </a:t>
+            </a:r>
+            <a:r>
+              <a:rPr lang="en-US" dirty="0" err="1"/>
+              <a:t>pg_dump</a:t>
+            </a:r>
+            <a:r>
+              <a:rPr lang="en-US" dirty="0"/>
+              <a:t> to prompt for the password before connecting to the PostgreSQL database server. After you press Enter, </a:t>
+            </a:r>
+            <a:r>
+              <a:rPr lang="en-US" dirty="0" err="1"/>
+              <a:t>pg_dump</a:t>
+            </a:r>
+            <a:r>
+              <a:rPr lang="en-US" dirty="0"/>
+              <a:t> will prompt for the password of the database user from which the connection is initiated</a:t>
+            </a:r>
+            <a:r>
+              <a:rPr lang="en-US" dirty="0" smtClean="0"/>
+              <a:t>.</a:t>
+            </a:r>
+          </a:p>
+          <a:p>
+            <a:pPr lvl="1" fontAlgn="base"/>
+            <a:r>
+              <a:rPr lang="en-US" dirty="0" smtClean="0"/>
+              <a:t>F </a:t>
+            </a:r>
+            <a:r>
+              <a:rPr lang="en-US" dirty="0"/>
+              <a:t>switch: The -F switch specifies the output file format that will be used. We specified the t option with the -F switch because the output file will be implemented as a tar format archive file</a:t>
+            </a:r>
+            <a:r>
+              <a:rPr lang="en-US" dirty="0" smtClean="0"/>
+              <a:t>.</a:t>
             </a:r>
           </a:p>
           <a:p>
             <a:pPr fontAlgn="base"/>
             <a:r>
+              <a:rPr lang="en-US" dirty="0" smtClean="0"/>
+              <a:t>There </a:t>
+            </a:r>
+            <a:r>
               <a:rPr lang="en-US" dirty="0"/>
-              <a:t>It is essential to have a planning strategy in order to implement backups. This is desirable from the point of view of a recovery scenario, and in the event of such a situation arising, the type of backups that we initiate will influence the type of recovery that is possible.</a:t>
-            </a:r>
-            <a:endParaRPr lang="en-US" dirty="0"/>
+              <a:t>are plenty of other options available with the </a:t>
+            </a:r>
+            <a:r>
+              <a:rPr lang="en-US" dirty="0" err="1"/>
+              <a:t>pg_dump</a:t>
+            </a:r>
+            <a:r>
+              <a:rPr lang="en-US" dirty="0"/>
+              <a:t> command; however, for our purpose, we are going to the use the preceding options.</a:t>
+            </a:r>
           </a:p>
         </p:txBody>
       </p:sp>
     </p:spTree>
     <p:extLst>
       <p:ext uri="{BB962C8B-B14F-4D97-AF65-F5344CB8AC3E}">
-        <p14:creationId xmlns:p14="http://schemas.microsoft.com/office/powerpoint/2010/main" val="917579460"/>
+        <p14:creationId xmlns:p14="http://schemas.microsoft.com/office/powerpoint/2010/main" val="1822078032"/>
       </p:ext>
     </p:extLst>
   </p:cSld>
@@ -6546,11 +6664,7 @@
           <a:p>
             <a:r>
               <a:rPr lang="en-US" dirty="0" smtClean="0"/>
-              <a:t>Appendix – Backup – Logical Backups – Getting Ready</a:t>
-            </a:r>
-            <a:r>
-              <a:rPr lang="en-US" dirty="0" smtClean="0"/>
-              <a:t/>
+              <a:t>Appendix – Backup – Logical Backups – Doing It</a:t>
             </a:r>
             <a:br>
               <a:rPr lang="en-US" dirty="0" smtClean="0"/>
@@ -6584,15 +6698,45 @@
             <a:pPr fontAlgn="base"/>
             <a:r>
               <a:rPr lang="en-US" dirty="0"/>
-              <a:t>Please note that the dump keyword is evenly used here as a synonym for </a:t>
+              <a:t>Here, in our situation, we have a database named </a:t>
             </a:r>
             <a:r>
               <a:rPr lang="en-US" dirty="0" err="1"/>
-              <a:t>backup.The</a:t>
+              <a:t>dvdrental</a:t>
             </a:r>
             <a:r>
               <a:rPr lang="en-US" dirty="0"/>
-              <a:t> </a:t>
+              <a:t> for which we need to generate a logical dump</a:t>
+            </a:r>
+            <a:r>
+              <a:rPr lang="en-US" dirty="0" smtClean="0"/>
+              <a:t>.</a:t>
+            </a:r>
+          </a:p>
+          <a:p>
+            <a:pPr fontAlgn="base"/>
+            <a:r>
+              <a:rPr lang="en-US" dirty="0" smtClean="0"/>
+              <a:t>There </a:t>
+            </a:r>
+            <a:r>
+              <a:rPr lang="en-US" dirty="0"/>
+              <a:t>are two ways in which a logical dump can be initiated in PostgreSQL</a:t>
+            </a:r>
+            <a:r>
+              <a:rPr lang="en-US" dirty="0" smtClean="0"/>
+              <a:t>:</a:t>
+            </a:r>
+          </a:p>
+          <a:p>
+            <a:pPr lvl="1" fontAlgn="base"/>
+            <a:r>
+              <a:rPr lang="en-US" dirty="0" smtClean="0"/>
+              <a:t>The </a:t>
+            </a:r>
+            <a:r>
+              <a:rPr lang="en-US" dirty="0"/>
+              <a:t>first approach is to use the command-line utility </a:t>
             </a:r>
             <a:r>
               <a:rPr lang="en-US" dirty="0" err="1"/>
@@ -6600,22 +6744,43 @@
             </a:r>
             <a:r>
               <a:rPr lang="en-US" dirty="0"/>
-              <a:t> utility is considered to be a logical backup because it makes a copy of the data in the database by dumping out the contents of each table</a:t>
-            </a:r>
-            <a:r>
-              <a:rPr lang="en-US" dirty="0" smtClean="0"/>
-              <a:t>.</a:t>
-            </a:r>
-          </a:p>
-          <a:p>
-            <a:pPr fontAlgn="base"/>
-            <a:r>
-              <a:rPr lang="en-US" dirty="0" smtClean="0"/>
-              <a:t>The </a:t>
+              <a:t> to make a logical dump of a database. </a:t>
+            </a:r>
+            <a:endParaRPr lang="en-US" dirty="0" smtClean="0"/>
+          </a:p>
+          <a:p>
+            <a:pPr lvl="1" fontAlgn="base"/>
+            <a:r>
+              <a:rPr lang="en-US" dirty="0" smtClean="0"/>
+              <a:t>Here</a:t>
             </a:r>
             <a:r>
               <a:rPr lang="en-US" dirty="0"/>
-              <a:t>basic syntax to take a logical backup of a single database is mentioned here</a:t>
+              <a:t>, we use the </a:t>
+            </a:r>
+            <a:r>
+              <a:rPr lang="en-US" dirty="0" err="1"/>
+              <a:t>pg_dump</a:t>
+            </a:r>
+            <a:r>
+              <a:rPr lang="en-US" dirty="0"/>
+              <a:t> utility to back up the </a:t>
+            </a:r>
+            <a:r>
+              <a:rPr lang="en-US" dirty="0" err="1"/>
+              <a:t>dvdrental</a:t>
+            </a:r>
+            <a:r>
+              <a:rPr lang="en-US" dirty="0"/>
+              <a:t> database in an output file named dvdrental.tar, which is saved in the </a:t>
+            </a:r>
+            <a:r>
+              <a:rPr lang="en-US" dirty="0" err="1"/>
+              <a:t>abcd</a:t>
+            </a:r>
+            <a:r>
+              <a:rPr lang="en-US" dirty="0"/>
+              <a:t> subdirectory of the home directory</a:t>
             </a:r>
             <a:r>
               <a:rPr lang="en-US" dirty="0" smtClean="0"/>
@@ -6623,7 +6788,7 @@
             </a:r>
           </a:p>
           <a:p>
-            <a:pPr lvl="1" fontAlgn="base"/>
+            <a:pPr lvl="2" fontAlgn="base"/>
             <a:r>
               <a:rPr lang="en-US" dirty="0" err="1" smtClean="0"/>
               <a:t>pg_dump</a:t>
@@ -6634,147 +6799,86 @@
             </a:r>
             <a:r>
               <a:rPr lang="en-US" dirty="0"/>
-              <a:t>-U username -W -F t </a:t>
+              <a:t>-U </a:t>
             </a:r>
             <a:r>
               <a:rPr lang="en-US" dirty="0" err="1"/>
-              <a:t>database_name</a:t>
+              <a:t>postgres</a:t>
             </a:r>
             <a:r>
               <a:rPr lang="en-US" dirty="0"/>
-              <a:t> &gt; [Backup Location Path</a:t>
-            </a:r>
-            <a:r>
-              <a:rPr lang="en-US" dirty="0" smtClean="0"/>
-              <a:t>]</a:t>
+              <a:t> -W -F t </a:t>
+            </a:r>
+            <a:r>
+              <a:rPr lang="en-US" dirty="0" err="1"/>
+              <a:t>dvdrental</a:t>
+            </a:r>
+            <a:r>
+              <a:rPr lang="en-US" dirty="0"/>
+              <a:t> &gt; /</a:t>
+            </a:r>
+            <a:r>
+              <a:rPr lang="en-US" dirty="0" smtClean="0"/>
+              <a:t>home/</a:t>
+            </a:r>
+            <a:r>
+              <a:rPr lang="en-US" dirty="0" err="1" smtClean="0"/>
+              <a:t>abcd</a:t>
+            </a:r>
+            <a:r>
+              <a:rPr lang="en-US" dirty="0" smtClean="0"/>
+              <a:t>/dvdrental.tar</a:t>
             </a:r>
           </a:p>
           <a:p>
             <a:pPr fontAlgn="base"/>
             <a:r>
               <a:rPr lang="en-US" dirty="0" smtClean="0"/>
-              <a:t>The </a:t>
-            </a:r>
-            <a:r>
-              <a:rPr lang="en-US" dirty="0"/>
-              <a:t>usage of the options used with the </a:t>
-            </a:r>
-            <a:r>
-              <a:rPr lang="en-US" dirty="0" err="1"/>
-              <a:t>pg_dump</a:t>
-            </a:r>
-            <a:r>
-              <a:rPr lang="en-US" dirty="0"/>
-              <a:t> command is explained here</a:t>
-            </a:r>
-            <a:r>
-              <a:rPr lang="en-US" dirty="0" smtClean="0"/>
-              <a:t>:</a:t>
-            </a:r>
-          </a:p>
-          <a:p>
-            <a:pPr lvl="1" fontAlgn="base"/>
-            <a:r>
-              <a:rPr lang="en-US" dirty="0" smtClean="0"/>
-              <a:t>U </a:t>
-            </a:r>
-            <a:r>
-              <a:rPr lang="en-US" dirty="0"/>
-              <a:t>switch: The -U switch specifies the database user initiating the connection. As </a:t>
-            </a:r>
-            <a:r>
-              <a:rPr lang="en-US" dirty="0" err="1"/>
-              <a:t>pg_dump</a:t>
-            </a:r>
-            <a:r>
-              <a:rPr lang="en-US" dirty="0"/>
-              <a:t> is a command-line utility, we need to specify the username via which the </a:t>
-            </a:r>
-            <a:r>
-              <a:rPr lang="en-US" dirty="0" err="1"/>
-              <a:t>pg_dump</a:t>
-            </a:r>
-            <a:r>
-              <a:rPr lang="en-US" dirty="0"/>
-              <a:t> utility can make a database connection</a:t>
-            </a:r>
-            <a:r>
-              <a:rPr lang="en-US" dirty="0" smtClean="0"/>
-              <a:t>.</a:t>
-            </a:r>
-          </a:p>
-          <a:p>
-            <a:pPr lvl="1" fontAlgn="base"/>
-            <a:r>
-              <a:rPr lang="en-US" dirty="0" smtClean="0"/>
-              <a:t>W </a:t>
-            </a:r>
-            <a:r>
-              <a:rPr lang="en-US" dirty="0"/>
-              <a:t>switch: This option is not mandatory. This option forces </a:t>
-            </a:r>
-            <a:r>
-              <a:rPr lang="en-US" dirty="0" err="1"/>
-              <a:t>pg_dump</a:t>
-            </a:r>
-            <a:r>
-              <a:rPr lang="en-US" dirty="0"/>
-              <a:t> to prompt for the password before connecting to the PostgreSQL database server. After you press Enter, </a:t>
-            </a:r>
-            <a:r>
-              <a:rPr lang="en-US" dirty="0" err="1"/>
-              <a:t>pg_dump</a:t>
-            </a:r>
-            <a:r>
-              <a:rPr lang="en-US" dirty="0"/>
-              <a:t> will prompt for the password of the database user from which the connection is initiated</a:t>
-            </a:r>
-            <a:r>
-              <a:rPr lang="en-US" dirty="0" smtClean="0"/>
-              <a:t>.</a:t>
-            </a:r>
-          </a:p>
-          <a:p>
-            <a:pPr lvl="1" fontAlgn="base"/>
-            <a:r>
-              <a:rPr lang="en-US" dirty="0" smtClean="0"/>
-              <a:t>F </a:t>
-            </a:r>
-            <a:r>
-              <a:rPr lang="en-US" dirty="0"/>
-              <a:t>switch: The -F switch specifies the output file format that will be used. We specified the t option with the -F switch because the output file will be implemented as a tar format archive file</a:t>
-            </a:r>
-            <a:r>
-              <a:rPr lang="en-US" dirty="0" smtClean="0"/>
-              <a:t>.</a:t>
+              <a:t>The second is </a:t>
+            </a:r>
+            <a:r>
+              <a:rPr lang="en-US" dirty="0" err="1" smtClean="0"/>
+              <a:t>pg</a:t>
+            </a:r>
+            <a:r>
+              <a:rPr lang="en-US" dirty="0" smtClean="0"/>
+              <a:t> admin/</a:t>
+            </a:r>
+            <a:r>
+              <a:rPr lang="en-US" dirty="0" err="1" smtClean="0"/>
+              <a:t>netcat</a:t>
+            </a:r>
+            <a:r>
+              <a:rPr lang="en-US" dirty="0" smtClean="0"/>
+              <a:t>/</a:t>
+            </a:r>
+            <a:r>
+              <a:rPr lang="en-US" dirty="0" err="1" smtClean="0"/>
+              <a:t>tsora</a:t>
+            </a:r>
+            <a:r>
+              <a:rPr lang="en-US" dirty="0" smtClean="0"/>
+              <a:t> tools.  A </a:t>
+            </a:r>
+            <a:r>
+              <a:rPr lang="en-US" dirty="0" err="1" smtClean="0"/>
+              <a:t>Gui</a:t>
+            </a:r>
+            <a:r>
+              <a:rPr lang="en-US" dirty="0" smtClean="0"/>
+              <a:t> basically</a:t>
             </a:r>
           </a:p>
           <a:p>
             <a:pPr fontAlgn="base"/>
-            <a:r>
-              <a:rPr lang="en-US" dirty="0" smtClean="0"/>
-              <a:t>There </a:t>
-            </a:r>
-            <a:r>
-              <a:rPr lang="en-US" dirty="0"/>
-              <a:t>are plenty of other options available with the </a:t>
-            </a:r>
-            <a:r>
-              <a:rPr lang="en-US" dirty="0" err="1"/>
-              <a:t>pg_dump</a:t>
-            </a:r>
-            <a:r>
-              <a:rPr lang="en-US" dirty="0"/>
-              <a:t> command; however, for our purpose, we are going to the use the preceding options.</a:t>
-            </a:r>
-            <a:endParaRPr lang="en-US" dirty="0"/>
+            <a:endParaRPr lang="en-US" dirty="0" smtClean="0"/>
           </a:p>
         </p:txBody>
       </p:sp>
     </p:spTree>
     <p:extLst>
       <p:ext uri="{BB962C8B-B14F-4D97-AF65-F5344CB8AC3E}">
-        <p14:creationId xmlns:p14="http://schemas.microsoft.com/office/powerpoint/2010/main" val="1822078032"/>
+        <p14:creationId xmlns:p14="http://schemas.microsoft.com/office/powerpoint/2010/main" val="325092810"/>
       </p:ext>
     </p:extLst>
   </p:cSld>
@@ -6825,11 +6929,7 @@
           <a:p>
             <a:r>
               <a:rPr lang="en-US" dirty="0" smtClean="0"/>
-              <a:t>Appendix – Backup – Logical Backups – Doing It</a:t>
-            </a:r>
-            <a:r>
-              <a:rPr lang="en-US" dirty="0" smtClean="0"/>
-              <a:t/>
+              <a:t>Appendix – Backup – Logical Backups – All Databases</a:t>
             </a:r>
             <a:br>
               <a:rPr lang="en-US" dirty="0" smtClean="0"/>
@@ -6863,45 +6963,7 @@
             <a:pPr fontAlgn="base"/>
             <a:r>
               <a:rPr lang="en-US" dirty="0"/>
-              <a:t>Here, in our situation, we have a database named </a:t>
-            </a:r>
-            <a:r>
-              <a:rPr lang="en-US" dirty="0" err="1"/>
-              <a:t>dvdrental</a:t>
-            </a:r>
-            <a:r>
-              <a:rPr lang="en-US" dirty="0"/>
-              <a:t> for which we need to generate a logical dump</a:t>
-            </a:r>
-            <a:r>
-              <a:rPr lang="en-US" dirty="0" smtClean="0"/>
-              <a:t>.</a:t>
-            </a:r>
-          </a:p>
-          <a:p>
-            <a:pPr fontAlgn="base"/>
-            <a:r>
-              <a:rPr lang="en-US" dirty="0" smtClean="0"/>
-              <a:t>There </a:t>
-            </a:r>
-            <a:r>
-              <a:rPr lang="en-US" dirty="0"/>
-              <a:t>are two ways in which a logical dump can be initiated in PostgreSQL</a:t>
-            </a:r>
-            <a:r>
-              <a:rPr lang="en-US" dirty="0" smtClean="0"/>
-              <a:t>:</a:t>
-            </a:r>
-          </a:p>
-          <a:p>
-            <a:pPr lvl="1" fontAlgn="base"/>
-            <a:r>
-              <a:rPr lang="en-US" dirty="0" smtClean="0"/>
-              <a:t>The </a:t>
-            </a:r>
-            <a:r>
-              <a:rPr lang="en-US" dirty="0"/>
-              <a:t>first approach is to use the command-line utility </a:t>
+              <a:t>You can use the </a:t>
             </a:r>
             <a:r>
               <a:rPr lang="en-US" dirty="0" err="1"/>
@@ -6909,19 +6971,7 @@
             </a:r>
             <a:r>
               <a:rPr lang="en-US" dirty="0"/>
-              <a:t> to make a logical dump of a database. </a:t>
-            </a:r>
-            <a:endParaRPr lang="en-US" dirty="0" smtClean="0"/>
-          </a:p>
-          <a:p>
-            <a:pPr lvl="1" fontAlgn="base"/>
-            <a:r>
-              <a:rPr lang="en-US" dirty="0" smtClean="0"/>
-              <a:t>Here</a:t>
-            </a:r>
-            <a:r>
-              <a:rPr lang="en-US" dirty="0"/>
-              <a:t>, we use the </a:t>
+              <a:t> command to back up each database in the server; however, </a:t>
             </a:r>
             <a:r>
               <a:rPr lang="en-US" dirty="0" err="1"/>
@@ -6929,23 +6979,53 @@
             </a:r>
             <a:r>
               <a:rPr lang="en-US" dirty="0"/>
-              <a:t> utility to back up the </a:t>
+              <a:t> does not dump information about the role definition and tablespaces. </a:t>
+            </a:r>
+            <a:endParaRPr lang="en-US" dirty="0" smtClean="0"/>
+          </a:p>
+          <a:p>
+            <a:pPr fontAlgn="base"/>
+            <a:r>
+              <a:rPr lang="en-US" dirty="0" smtClean="0"/>
+              <a:t>To </a:t>
+            </a:r>
+            <a:r>
+              <a:rPr lang="en-US" dirty="0"/>
+              <a:t>dump the global information, use the following command</a:t>
+            </a:r>
+            <a:r>
+              <a:rPr lang="en-US" dirty="0" smtClean="0"/>
+              <a:t>:</a:t>
+            </a:r>
+          </a:p>
+          <a:p>
+            <a:pPr lvl="1" fontAlgn="base"/>
+            <a:r>
+              <a:rPr lang="en-US" dirty="0" err="1" smtClean="0"/>
+              <a:t>pg_dumpall</a:t>
+            </a:r>
+            <a:r>
+              <a:rPr lang="en-US" dirty="0" smtClean="0"/>
+              <a:t> –g</a:t>
+            </a:r>
+          </a:p>
+          <a:p>
+            <a:pPr fontAlgn="base"/>
+            <a:r>
+              <a:rPr lang="en-US" dirty="0" smtClean="0"/>
+              <a:t>To </a:t>
+            </a:r>
+            <a:r>
+              <a:rPr lang="en-US" dirty="0"/>
+              <a:t>back up all the databases in one go, you can use the </a:t>
             </a:r>
             <a:r>
               <a:rPr lang="en-US" dirty="0" err="1"/>
-              <a:t>dvdrental</a:t>
+              <a:t>pg_dumpall</a:t>
             </a:r>
             <a:r>
               <a:rPr lang="en-US" dirty="0"/>
-              <a:t> database in an output file named dvdrental.tar, which is saved in the </a:t>
-            </a:r>
-            <a:r>
-              <a:rPr lang="en-US" dirty="0" err="1"/>
-              <a:t>abcd</a:t>
-            </a:r>
-            <a:r>
-              <a:rPr lang="en-US" dirty="0"/>
-              <a:t> subdirectory of the home directory</a:t>
+              <a:t> utility, as follows, in Windows</a:t>
             </a:r>
             <a:r>
               <a:rPr lang="en-US" dirty="0" smtClean="0"/>
@@ -6953,10 +7033,10 @@
             </a:r>
           </a:p>
           <a:p>
-            <a:pPr lvl="2" fontAlgn="base"/>
+            <a:pPr lvl="1" fontAlgn="base"/>
             <a:r>
               <a:rPr lang="en-US" dirty="0" err="1" smtClean="0"/>
-              <a:t>pg_dump</a:t>
+              <a:t>pg_dumpall</a:t>
             </a:r>
             <a:r>
               <a:rPr lang="en-US" dirty="0" smtClean="0"/>
@@ -6972,70 +7052,70 @@
             </a:r>
             <a:r>
               <a:rPr lang="en-US" dirty="0"/>
-              <a:t> -W -F t </a:t>
+              <a:t> &gt; c:\</a:t>
+            </a:r>
+            <a:r>
+              <a:rPr lang="en-US" dirty="0" smtClean="0"/>
+              <a:t>pgbackup\all.sql</a:t>
+            </a:r>
+          </a:p>
+          <a:p>
+            <a:pPr fontAlgn="base"/>
+            <a:r>
+              <a:rPr lang="en-US" dirty="0" smtClean="0"/>
+              <a:t>Similarly</a:t>
+            </a:r>
+            <a:r>
+              <a:rPr lang="en-US" dirty="0"/>
+              <a:t>, to back up all the databases in one go in Linux, use the </a:t>
             </a:r>
             <a:r>
               <a:rPr lang="en-US" dirty="0" err="1"/>
-              <a:t>dvdrental</a:t>
+              <a:t>pg_dumpall</a:t>
             </a:r>
             <a:r>
               <a:rPr lang="en-US" dirty="0"/>
-              <a:t> &gt; /</a:t>
-            </a:r>
-            <a:r>
-              <a:rPr lang="en-US" dirty="0" smtClean="0"/>
-              <a:t>home/</a:t>
-            </a:r>
+              <a:t> command, as follows</a:t>
+            </a:r>
+            <a:r>
+              <a:rPr lang="en-US" dirty="0" smtClean="0"/>
+              <a:t>:</a:t>
+            </a:r>
+          </a:p>
+          <a:p>
+            <a:pPr lvl="1" fontAlgn="base"/>
             <a:r>
               <a:rPr lang="en-US" dirty="0" err="1" smtClean="0"/>
-              <a:t>abcd</a:t>
-            </a:r>
-            <a:r>
-              <a:rPr lang="en-US" dirty="0" smtClean="0"/>
-              <a:t>/dvdrental.tar</a:t>
-            </a:r>
-          </a:p>
-          <a:p>
-            <a:pPr fontAlgn="base"/>
-            <a:r>
-              <a:rPr lang="en-US" dirty="0" smtClean="0"/>
-              <a:t>The second is </a:t>
-            </a:r>
-            <a:r>
-              <a:rPr lang="en-US" dirty="0" err="1" smtClean="0"/>
-              <a:t>pg</a:t>
-            </a:r>
-            <a:r>
-              <a:rPr lang="en-US" dirty="0" smtClean="0"/>
-              <a:t> admin/</a:t>
-            </a:r>
-            <a:r>
-              <a:rPr lang="en-US" dirty="0" err="1" smtClean="0"/>
-              <a:t>netcat</a:t>
-            </a:r>
-            <a:r>
-              <a:rPr lang="en-US" dirty="0" smtClean="0"/>
+              <a:t>pg_dumpall</a:t>
+            </a:r>
+            <a:r>
+              <a:rPr lang="en-US" dirty="0" smtClean="0"/>
+              <a:t> </a:t>
+            </a:r>
+            <a:r>
+              <a:rPr lang="en-US" dirty="0"/>
+              <a:t>-U </a:t>
+            </a:r>
+            <a:r>
+              <a:rPr lang="en-US" dirty="0" err="1"/>
+              <a:t>postgres</a:t>
+            </a:r>
+            <a:r>
+              <a:rPr lang="en-US" dirty="0"/>
+              <a:t> &gt;   /home/</a:t>
+            </a:r>
+            <a:r>
+              <a:rPr lang="en-US" dirty="0" err="1"/>
+              <a:t>pgbackup</a:t>
+            </a:r>
+            <a:r>
+              <a:rPr lang="en-US" dirty="0"/>
               <a:t>/</a:t>
             </a:r>
             <a:r>
-              <a:rPr lang="en-US" dirty="0" err="1" smtClean="0"/>
-              <a:t>tsora</a:t>
-            </a:r>
-            <a:r>
-              <a:rPr lang="en-US" dirty="0" smtClean="0"/>
-              <a:t> tools.  A </a:t>
-            </a:r>
-            <a:r>
-              <a:rPr lang="en-US" dirty="0" err="1" smtClean="0"/>
-              <a:t>Gui</a:t>
-            </a:r>
-            <a:r>
-              <a:rPr lang="en-US" dirty="0" smtClean="0"/>
-              <a:t> basically</a:t>
-            </a:r>
-          </a:p>
-          <a:p>
-            <a:pPr fontAlgn="base"/>
+              <a:rPr lang="en-US" dirty="0" err="1"/>
+              <a:t>all.sql</a:t>
+            </a:r>
             <a:endParaRPr lang="en-US" dirty="0" smtClean="0"/>
           </a:p>
         </p:txBody>
@@ -7043,7 +7123,7 @@
     </p:spTree>
     <p:extLst>
       <p:ext uri="{BB962C8B-B14F-4D97-AF65-F5344CB8AC3E}">
-        <p14:creationId xmlns:p14="http://schemas.microsoft.com/office/powerpoint/2010/main" val="325092810"/>
+        <p14:creationId xmlns:p14="http://schemas.microsoft.com/office/powerpoint/2010/main" val="3388375658"/>
       </p:ext>
     </p:extLst>
   </p:cSld>
@@ -7094,260 +7174,7 @@
           <a:p>
             <a:r>
               <a:rPr lang="en-US" dirty="0" smtClean="0"/>
-              <a:t>Appendix – Backup – Logical Backups – All Databases</a:t>
-            </a:r>
-            <a:r>
-              <a:rPr lang="en-US" dirty="0" smtClean="0"/>
-              <a:t/>
-            </a:r>
-            <a:br>
-              <a:rPr lang="en-US" dirty="0" smtClean="0"/>
-            </a:br>
-            <a:endParaRPr lang="en-US" dirty="0"/>
-          </a:p>
-        </p:txBody>
-      </p:sp>
-      <p:sp>
-        <p:nvSpPr>
-          <p:cNvPr id="3" name="Subtitle 2"/>
-          <p:cNvSpPr>
-            <a:spLocks noGrp="1"/>
-          </p:cNvSpPr>
-          <p:nvPr>
-            <p:ph idx="1"/>
-          </p:nvPr>
-        </p:nvSpPr>
-        <p:spPr>
-          <a:xfrm>
-            <a:off x="677334" y="1219200"/>
-            <a:ext cx="9768244" cy="5461685"/>
-          </a:xfrm>
-        </p:spPr>
-        <p:txBody>
-          <a:bodyPr>
-            <a:normAutofit/>
-          </a:bodyPr>
-          <a:lstStyle/>
-          <a:p>
-            <a:pPr fontAlgn="base"/>
-            <a:r>
-              <a:rPr lang="en-US" dirty="0"/>
-              <a:t>You can use the </a:t>
-            </a:r>
-            <a:r>
-              <a:rPr lang="en-US" dirty="0" err="1"/>
-              <a:t>pg_dump</a:t>
-            </a:r>
-            <a:r>
-              <a:rPr lang="en-US" dirty="0"/>
-              <a:t> command to back up each database in the server; however, </a:t>
-            </a:r>
-            <a:r>
-              <a:rPr lang="en-US" dirty="0" err="1"/>
-              <a:t>pg_dump</a:t>
-            </a:r>
-            <a:r>
-              <a:rPr lang="en-US" dirty="0"/>
-              <a:t> does not dump information about the role definition and tablespaces. </a:t>
-            </a:r>
-            <a:endParaRPr lang="en-US" dirty="0" smtClean="0"/>
-          </a:p>
-          <a:p>
-            <a:pPr fontAlgn="base"/>
-            <a:r>
-              <a:rPr lang="en-US" dirty="0" smtClean="0"/>
-              <a:t>To </a:t>
-            </a:r>
-            <a:r>
-              <a:rPr lang="en-US" dirty="0"/>
-              <a:t>dump the global information, use the following command</a:t>
-            </a:r>
-            <a:r>
-              <a:rPr lang="en-US" dirty="0" smtClean="0"/>
-              <a:t>:</a:t>
-            </a:r>
-          </a:p>
-          <a:p>
-            <a:pPr lvl="1" fontAlgn="base"/>
-            <a:r>
-              <a:rPr lang="en-US" dirty="0" err="1" smtClean="0"/>
-              <a:t>pg_dumpall</a:t>
-            </a:r>
-            <a:r>
-              <a:rPr lang="en-US" dirty="0" smtClean="0"/>
-              <a:t> –g</a:t>
-            </a:r>
-          </a:p>
-          <a:p>
-            <a:pPr fontAlgn="base"/>
-            <a:r>
-              <a:rPr lang="en-US" dirty="0" smtClean="0"/>
-              <a:t>To </a:t>
-            </a:r>
-            <a:r>
-              <a:rPr lang="en-US" dirty="0"/>
-              <a:t>back up all the databases in one go, you can use the </a:t>
-            </a:r>
-            <a:r>
-              <a:rPr lang="en-US" dirty="0" err="1"/>
-              <a:t>pg_dumpall</a:t>
-            </a:r>
-            <a:r>
-              <a:rPr lang="en-US" dirty="0"/>
-              <a:t> utility, as follows, in Windows</a:t>
-            </a:r>
-            <a:r>
-              <a:rPr lang="en-US" dirty="0" smtClean="0"/>
-              <a:t>:</a:t>
-            </a:r>
-          </a:p>
-          <a:p>
-            <a:pPr lvl="1" fontAlgn="base"/>
-            <a:r>
-              <a:rPr lang="en-US" dirty="0" err="1" smtClean="0"/>
-              <a:t>pg_dumpall</a:t>
-            </a:r>
-            <a:r>
-              <a:rPr lang="en-US" dirty="0" smtClean="0"/>
-              <a:t> </a:t>
-            </a:r>
-            <a:r>
-              <a:rPr lang="en-US" dirty="0"/>
-              <a:t>-U </a:t>
-            </a:r>
-            <a:r>
-              <a:rPr lang="en-US" dirty="0" err="1"/>
-              <a:t>postgres</a:t>
-            </a:r>
-            <a:r>
-              <a:rPr lang="en-US" dirty="0"/>
-              <a:t> &gt; c:\</a:t>
-            </a:r>
-            <a:r>
-              <a:rPr lang="en-US" dirty="0" smtClean="0"/>
-              <a:t>pgbackup\all.sql</a:t>
-            </a:r>
-          </a:p>
-          <a:p>
-            <a:pPr fontAlgn="base"/>
-            <a:r>
-              <a:rPr lang="en-US" dirty="0" smtClean="0"/>
-              <a:t>Similarly</a:t>
-            </a:r>
-            <a:r>
-              <a:rPr lang="en-US" dirty="0"/>
-              <a:t>, to back up all the databases in one go in Linux, use the </a:t>
-            </a:r>
-            <a:r>
-              <a:rPr lang="en-US" dirty="0" err="1"/>
-              <a:t>pg_dumpall</a:t>
-            </a:r>
-            <a:r>
-              <a:rPr lang="en-US" dirty="0"/>
-              <a:t> command, as follows</a:t>
-            </a:r>
-            <a:r>
-              <a:rPr lang="en-US" dirty="0" smtClean="0"/>
-              <a:t>:</a:t>
-            </a:r>
-          </a:p>
-          <a:p>
-            <a:pPr lvl="1" fontAlgn="base"/>
-            <a:r>
-              <a:rPr lang="en-US" dirty="0" err="1" smtClean="0"/>
-              <a:t>pg_dumpall</a:t>
-            </a:r>
-            <a:r>
-              <a:rPr lang="en-US" dirty="0" smtClean="0"/>
-              <a:t> </a:t>
-            </a:r>
-            <a:r>
-              <a:rPr lang="en-US" dirty="0"/>
-              <a:t>-U </a:t>
-            </a:r>
-            <a:r>
-              <a:rPr lang="en-US" dirty="0" err="1"/>
-              <a:t>postgres</a:t>
-            </a:r>
-            <a:r>
-              <a:rPr lang="en-US" dirty="0"/>
-              <a:t> &gt;   /home/</a:t>
-            </a:r>
-            <a:r>
-              <a:rPr lang="en-US" dirty="0" err="1"/>
-              <a:t>pgbackup</a:t>
-            </a:r>
-            <a:r>
-              <a:rPr lang="en-US" dirty="0"/>
-              <a:t>/</a:t>
-            </a:r>
-            <a:r>
-              <a:rPr lang="en-US" dirty="0" err="1"/>
-              <a:t>all.sql</a:t>
-            </a:r>
-            <a:endParaRPr lang="en-US" dirty="0" smtClean="0"/>
-          </a:p>
-        </p:txBody>
-      </p:sp>
-    </p:spTree>
-    <p:extLst>
-      <p:ext uri="{BB962C8B-B14F-4D97-AF65-F5344CB8AC3E}">
-        <p14:creationId xmlns:p14="http://schemas.microsoft.com/office/powerpoint/2010/main" val="3388375658"/>
-      </p:ext>
-    </p:extLst>
-  </p:cSld>
-  <p:clrMapOvr>
-    <a:masterClrMapping/>
-  </p:clrMapOvr>
-</p:sld>
-</file>
-
-<file path=ppt/slides/slide16.xml><?xml version="1.0" encoding="utf-8"?>
-<p:sld xmlns:a="http://schemas.openxmlformats.org/drawingml/2006/main" xmlns:r="http://schemas.openxmlformats.org/officeDocument/2006/relationships" xmlns:p="http://schemas.openxmlformats.org/presentationml/2006/main">
-  <p:cSld>
-    <p:spTree>
-      <p:nvGrpSpPr>
-        <p:cNvPr id="1" name=""/>
-        <p:cNvGrpSpPr/>
-        <p:nvPr/>
-      </p:nvGrpSpPr>
-      <p:grpSpPr>
-        <a:xfrm>
-          <a:off x="0" y="0"/>
-          <a:ext cx="0" cy="0"/>
-          <a:chOff x="0" y="0"/>
-          <a:chExt cx="0" cy="0"/>
-        </a:xfrm>
-      </p:grpSpPr>
-      <p:sp>
-        <p:nvSpPr>
-          <p:cNvPr id="2" name="Title 1"/>
-          <p:cNvSpPr>
-            <a:spLocks noGrp="1"/>
-          </p:cNvSpPr>
-          <p:nvPr>
-            <p:ph type="title"/>
-          </p:nvPr>
-        </p:nvSpPr>
-        <p:spPr>
-          <a:xfrm>
-            <a:off x="677334" y="0"/>
-            <a:ext cx="8596668" cy="1320800"/>
-          </a:xfrm>
-        </p:spPr>
-        <p:txBody>
-          <a:bodyPr>
-            <a:normAutofit fontScale="90000"/>
-          </a:bodyPr>
-          <a:lstStyle/>
-          <a:p>
-            <a:r>
-              <a:rPr lang="en-US" dirty="0" smtClean="0"/>
               <a:t>Appendix – Backup – Logical Backups – Single Object</a:t>
-            </a:r>
-            <a:r>
-              <a:rPr lang="en-US" dirty="0" smtClean="0"/>
-              <a:t/>
             </a:r>
             <a:br>
               <a:rPr lang="en-US" dirty="0" smtClean="0"/>
@@ -8314,11 +8141,7 @@
             </a:r>
             <a:r>
               <a:rPr lang="en-US" dirty="0" smtClean="0"/>
-              <a:t> – </a:t>
-            </a:r>
-            <a:r>
-              <a:rPr lang="en-US" dirty="0" smtClean="0"/>
-              <a:t>Settings and Other Sundries</a:t>
+              <a:t> – Settings and Other Sundries</a:t>
             </a:r>
             <a:endParaRPr lang="en-US" dirty="0"/>
           </a:p>
@@ -8487,16 +8310,8 @@
           <a:lstStyle/>
           <a:p>
             <a:r>
-              <a:rPr lang="en-US" dirty="0" err="1" smtClean="0"/>
-              <a:t>Postgresql</a:t>
-            </a:r>
-            <a:r>
-              <a:rPr lang="en-US" dirty="0" smtClean="0"/>
-              <a:t> – </a:t>
-            </a:r>
-            <a:r>
-              <a:rPr lang="en-US" dirty="0" smtClean="0"/>
-              <a:t>Settings and Other Sundries</a:t>
+              <a:rPr lang="en-US" dirty="0" smtClean="0"/>
+              <a:t>Logging and Getting Information</a:t>
             </a:r>
             <a:endParaRPr lang="en-US" dirty="0"/>
           </a:p>
@@ -8535,28 +8350,9 @@
               <a:rPr lang="en-US" dirty="0" smtClean="0">
                 <a:hlinkClick r:id="rId2"/>
               </a:rPr>
-              <a:t>www.postgresql.org/docs/9.5/static/config-setting.html</a:t>
+              <a:t>www.safaribooksonline.com/library/view/postgresql-9-administration/9781849519069/ch02s05.html</a:t>
             </a:r>
             <a:endParaRPr lang="en-US" dirty="0" smtClean="0"/>
-          </a:p>
-          <a:p>
-            <a:pPr fontAlgn="base"/>
-            <a:r>
-              <a:rPr lang="en-US" dirty="0" smtClean="0"/>
-              <a:t>Manual Review of </a:t>
-            </a:r>
-            <a:r>
-              <a:rPr lang="en-US" dirty="0" err="1" smtClean="0"/>
-              <a:t>postgresql.conf</a:t>
-            </a:r>
-            <a:endParaRPr lang="en-US" dirty="0" smtClean="0"/>
-          </a:p>
-          <a:p>
-            <a:pPr fontAlgn="base"/>
-            <a:r>
-              <a:rPr lang="en-US" dirty="0" smtClean="0"/>
-              <a:t>Manual Review of RDS Parameter Groups</a:t>
-            </a:r>
           </a:p>
           <a:p>
             <a:pPr fontAlgn="base"/>
@@ -8570,28 +8366,25 @@
               <a:rPr lang="en-US" dirty="0" smtClean="0">
                 <a:hlinkClick r:id="rId3"/>
               </a:rPr>
-              <a:t>www.safaribooksonline.com/library/view/learning-postgresql/9781783989188/ch08.html</a:t>
+              <a:t>www.safaribooksonline.com/library/view/learning-postgresql/9781783989188/ch09.html</a:t>
             </a:r>
             <a:endParaRPr lang="en-US" dirty="0" smtClean="0"/>
           </a:p>
           <a:p>
             <a:pPr fontAlgn="base"/>
             <a:r>
-              <a:rPr lang="en-US" dirty="0" smtClean="0"/>
-              <a:t>Manual Review of </a:t>
-            </a:r>
-            <a:r>
-              <a:rPr lang="en-US" dirty="0" err="1" smtClean="0"/>
-              <a:t>pg_hba.conf</a:t>
+              <a:rPr lang="en-US" dirty="0">
+                <a:hlinkClick r:id="rId4"/>
+              </a:rPr>
+              <a:t>https://</a:t>
+            </a:r>
+            <a:r>
+              <a:rPr lang="en-US" dirty="0" smtClean="0">
+                <a:hlinkClick r:id="rId4"/>
+              </a:rPr>
+              <a:t>www.safaribooksonline.com/library/view/postgresql-for-data/9781783288601/ch02s07.html</a:t>
             </a:r>
             <a:endParaRPr lang="en-US" dirty="0" smtClean="0"/>
-          </a:p>
-          <a:p>
-            <a:pPr fontAlgn="base"/>
-            <a:r>
-              <a:rPr lang="en-US" dirty="0" smtClean="0"/>
-              <a:t>RDS Security Groups</a:t>
-            </a:r>
           </a:p>
           <a:p>
             <a:pPr fontAlgn="base"/>
@@ -8608,7 +8401,7 @@
     </p:spTree>
     <p:extLst>
       <p:ext uri="{BB962C8B-B14F-4D97-AF65-F5344CB8AC3E}">
-        <p14:creationId xmlns:p14="http://schemas.microsoft.com/office/powerpoint/2010/main" val="3277216950"/>
+        <p14:creationId xmlns:p14="http://schemas.microsoft.com/office/powerpoint/2010/main" val="1284679253"/>
       </p:ext>
     </p:extLst>
   </p:cSld>
@@ -8666,7 +8459,7 @@
           <a:p>
             <a:r>
               <a:rPr lang="en-US" dirty="0" smtClean="0"/>
-              <a:t>Logging and Getting Information</a:t>
+              <a:t>Backup and Restore</a:t>
             </a:r>
             <a:endParaRPr lang="en-US" dirty="0"/>
           </a:p>
@@ -8705,7 +8498,7 @@
               <a:rPr lang="en-US" dirty="0" smtClean="0">
                 <a:hlinkClick r:id="rId2"/>
               </a:rPr>
-              <a:t>www.safaribooksonline.com/library/view/postgresql-9-administration/9781849519069/ch02s05.html</a:t>
+              <a:t>www.safaribooksonline.com/library/view/troubleshooting-postgresql/9781783555314/ch08.html</a:t>
             </a:r>
             <a:endParaRPr lang="en-US" dirty="0" smtClean="0"/>
           </a:p>
@@ -8721,24 +8514,12 @@
               <a:rPr lang="en-US" dirty="0" smtClean="0">
                 <a:hlinkClick r:id="rId3"/>
               </a:rPr>
-              <a:t>www.safaribooksonline.com/library/view/learning-postgresql/9781783989188/ch09.html</a:t>
+              <a:t>www.safaribooksonline.com/library/view/postgresql-for-data/9781783288601/ch10.html</a:t>
             </a:r>
             <a:endParaRPr lang="en-US" dirty="0" smtClean="0"/>
           </a:p>
           <a:p>
             <a:pPr fontAlgn="base"/>
-            <a:r>
-              <a:rPr lang="en-US" dirty="0">
-                <a:hlinkClick r:id="rId4"/>
-              </a:rPr>
-              <a:t>https://</a:t>
-            </a:r>
-            <a:r>
-              <a:rPr lang="en-US" dirty="0" smtClean="0">
-                <a:hlinkClick r:id="rId4"/>
-              </a:rPr>
-              <a:t>www.safaribooksonline.com/library/view/postgresql-for-data/9781783288601/ch02s07.html</a:t>
-            </a:r>
             <a:endParaRPr lang="en-US" dirty="0" smtClean="0"/>
           </a:p>
           <a:p>
@@ -8756,7 +8537,7 @@
     </p:spTree>
     <p:extLst>
       <p:ext uri="{BB962C8B-B14F-4D97-AF65-F5344CB8AC3E}">
-        <p14:creationId xmlns:p14="http://schemas.microsoft.com/office/powerpoint/2010/main" val="1284679253"/>
+        <p14:creationId xmlns:p14="http://schemas.microsoft.com/office/powerpoint/2010/main" val="1289870151"/>
       </p:ext>
     </p:extLst>
   </p:cSld>
@@ -8814,7 +8595,7 @@
           <a:p>
             <a:r>
               <a:rPr lang="en-US" dirty="0" smtClean="0"/>
-              <a:t>Backup and Restore</a:t>
+              <a:t>Client Tools</a:t>
             </a:r>
             <a:endParaRPr lang="en-US" dirty="0"/>
           </a:p>
@@ -8853,8 +8634,42 @@
               <a:rPr lang="en-US" dirty="0" smtClean="0">
                 <a:hlinkClick r:id="rId2"/>
               </a:rPr>
-              <a:t>www.safaribooksonline.com/library/view/troubleshooting-postgresql/9781783555314/ch08.html</a:t>
-            </a:r>
+              <a:t>www.safaribooksonline.com/library/view/postgresql-for-data/9781783288601/ch06.html</a:t>
+            </a:r>
+            <a:endParaRPr lang="en-US" dirty="0" smtClean="0"/>
+          </a:p>
+          <a:p>
+            <a:pPr fontAlgn="base"/>
+            <a:r>
+              <a:rPr lang="en-US" dirty="0" err="1" smtClean="0"/>
+              <a:t>Psql</a:t>
+            </a:r>
+            <a:endParaRPr lang="en-US" dirty="0" smtClean="0"/>
+          </a:p>
+          <a:p>
+            <a:pPr fontAlgn="base"/>
+            <a:r>
+              <a:rPr lang="en-US" dirty="0" err="1" smtClean="0"/>
+              <a:t>Pgadmin</a:t>
+            </a:r>
+            <a:r>
+              <a:rPr lang="en-US" dirty="0" smtClean="0"/>
+              <a:t> 3</a:t>
+            </a:r>
+          </a:p>
+          <a:p>
+            <a:pPr fontAlgn="base"/>
+            <a:r>
+              <a:rPr lang="en-US" dirty="0" err="1" smtClean="0"/>
+              <a:t>Pgadmin</a:t>
+            </a:r>
+            <a:r>
+              <a:rPr lang="en-US" dirty="0" smtClean="0"/>
+              <a:t> 4</a:t>
+            </a:r>
+          </a:p>
+          <a:p>
+            <a:pPr fontAlgn="base"/>
             <a:endParaRPr lang="en-US" dirty="0" smtClean="0"/>
           </a:p>
           <a:p>
@@ -8872,7 +8687,7 @@
     </p:spTree>
     <p:extLst>
       <p:ext uri="{BB962C8B-B14F-4D97-AF65-F5344CB8AC3E}">
-        <p14:creationId xmlns:p14="http://schemas.microsoft.com/office/powerpoint/2010/main" val="1289870151"/>
+        <p14:creationId xmlns:p14="http://schemas.microsoft.com/office/powerpoint/2010/main" val="601706753"/>
       </p:ext>
     </p:extLst>
   </p:cSld>

</xml_diff>